<commit_message>
add slide de infos sobre termos e etapas institucionais
</commit_message>
<xml_diff>
--- a/dados-abertos-kick-off-2022-02.pptx
+++ b/dados-abertos-kick-off-2022-02.pptx
@@ -5,7 +5,7 @@
     <p:sldMasterId id="2147483648" r:id="rId1"/>
   </p:sldMasterIdLst>
   <p:notesMasterIdLst>
-    <p:notesMasterId r:id="rId29"/>
+    <p:notesMasterId r:id="rId30"/>
   </p:notesMasterIdLst>
   <p:sldIdLst>
     <p:sldId id="289" r:id="rId2"/>
@@ -23,55 +23,56 @@
     <p:sldId id="273" r:id="rId14"/>
     <p:sldId id="274" r:id="rId15"/>
     <p:sldId id="275" r:id="rId16"/>
-    <p:sldId id="276" r:id="rId17"/>
-    <p:sldId id="277" r:id="rId18"/>
-    <p:sldId id="278" r:id="rId19"/>
-    <p:sldId id="279" r:id="rId20"/>
-    <p:sldId id="280" r:id="rId21"/>
-    <p:sldId id="281" r:id="rId22"/>
-    <p:sldId id="282" r:id="rId23"/>
-    <p:sldId id="283" r:id="rId24"/>
-    <p:sldId id="284" r:id="rId25"/>
-    <p:sldId id="285" r:id="rId26"/>
-    <p:sldId id="287" r:id="rId27"/>
-    <p:sldId id="286" r:id="rId28"/>
+    <p:sldId id="290" r:id="rId17"/>
+    <p:sldId id="276" r:id="rId18"/>
+    <p:sldId id="277" r:id="rId19"/>
+    <p:sldId id="278" r:id="rId20"/>
+    <p:sldId id="279" r:id="rId21"/>
+    <p:sldId id="280" r:id="rId22"/>
+    <p:sldId id="281" r:id="rId23"/>
+    <p:sldId id="282" r:id="rId24"/>
+    <p:sldId id="283" r:id="rId25"/>
+    <p:sldId id="284" r:id="rId26"/>
+    <p:sldId id="285" r:id="rId27"/>
+    <p:sldId id="287" r:id="rId28"/>
+    <p:sldId id="286" r:id="rId29"/>
   </p:sldIdLst>
   <p:sldSz cx="12192000" cy="6858000"/>
   <p:notesSz cx="6858000" cy="9144000"/>
   <p:embeddedFontLst>
     <p:embeddedFont>
       <p:font typeface="Comic Sans MS" panose="030F0702030302020204" pitchFamily="66" charset="0"/>
-      <p:regular r:id="rId30"/>
-      <p:bold r:id="rId31"/>
-      <p:italic r:id="rId32"/>
-      <p:boldItalic r:id="rId33"/>
+      <p:regular r:id="rId31"/>
+      <p:bold r:id="rId32"/>
+      <p:italic r:id="rId33"/>
+      <p:boldItalic r:id="rId34"/>
     </p:embeddedFont>
     <p:embeddedFont>
-      <p:font typeface="Arial Narrow" panose="020B0606020202030204" pitchFamily="34" charset="0"/>
-      <p:regular r:id="rId34"/>
+      <p:font typeface="Montserrat Black" panose="020B0604020202020204" charset="0"/>
       <p:bold r:id="rId35"/>
       <p:italic r:id="rId36"/>
       <p:boldItalic r:id="rId37"/>
     </p:embeddedFont>
     <p:embeddedFont>
-      <p:font typeface="Montserrat Black" panose="020B0604020202020204" charset="0"/>
-      <p:bold r:id="rId38"/>
-      <p:italic r:id="rId39"/>
-      <p:boldItalic r:id="rId40"/>
+      <p:font typeface="Arial Narrow" panose="020B0606020202030204" pitchFamily="34" charset="0"/>
+      <p:regular r:id="rId38"/>
+      <p:bold r:id="rId39"/>
+      <p:italic r:id="rId40"/>
+      <p:boldItalic r:id="rId41"/>
+    </p:embeddedFont>
+    <p:embeddedFont>
+      <p:font typeface="Roboto" panose="020B0604020202020204" charset="0"/>
+      <p:regular r:id="rId42"/>
+      <p:bold r:id="rId43"/>
+      <p:italic r:id="rId44"/>
+      <p:boldItalic r:id="rId45"/>
     </p:embeddedFont>
     <p:embeddedFont>
       <p:font typeface="Calibri" panose="020F0502020204030204" pitchFamily="34" charset="0"/>
-      <p:regular r:id="rId41"/>
-      <p:bold r:id="rId42"/>
-      <p:italic r:id="rId43"/>
-      <p:boldItalic r:id="rId44"/>
-    </p:embeddedFont>
-    <p:embeddedFont>
-      <p:font typeface="Roboto" panose="020B0604020202020204" charset="0"/>
-      <p:regular r:id="rId45"/>
-      <p:bold r:id="rId46"/>
-      <p:italic r:id="rId47"/>
-      <p:boldItalic r:id="rId48"/>
+      <p:regular r:id="rId46"/>
+      <p:bold r:id="rId47"/>
+      <p:italic r:id="rId48"/>
+      <p:boldItalic r:id="rId49"/>
     </p:embeddedFont>
   </p:embeddedFontLst>
   <p:defaultTextStyle>
@@ -308,7 +309,7 @@
       <p15:sldGuideLst xmlns:p15="http://schemas.microsoft.com/office/powerpoint/2012/main"/>
     </p:ext>
     <p:ext uri="http://customooxmlschemas.google.com/">
-      <go:slidesCustomData xmlns:go="http://customooxmlschemas.google.com/" xmlns:ahyp="http://schemas.microsoft.com/office/drawing/2018/hyperlinkcolor" xmlns:p15="http://schemas.microsoft.com/office/powerpoint/2012/main" xmlns:p14="http://schemas.microsoft.com/office/powerpoint/2010/main" xmlns:com="http://schemas.openxmlformats.org/drawingml/2006/compatibility" xmlns:pvml="urn:schemas-microsoft-com:office:powerpoint" xmlns:v="urn:schemas-microsoft-com:vml" xmlns:o="urn:schemas-microsoft-com:office:office" xmlns:dgm="http://schemas.openxmlformats.org/drawingml/2006/diagram" xmlns:c="http://schemas.openxmlformats.org/drawingml/2006/chart" xmlns:mv="urn:schemas-microsoft-com:mac:vml" xmlns:mc="http://schemas.openxmlformats.org/markup-compatibility/2006" xmlns="" r:id="rId54" roundtripDataSignature="AMtx7mhRAqkVhkxmJBd5mjEnvp0tEMTY6w=="/>
+      <go:slidesCustomData xmlns="" xmlns:mc="http://schemas.openxmlformats.org/markup-compatibility/2006" xmlns:mv="urn:schemas-microsoft-com:mac:vml" xmlns:c="http://schemas.openxmlformats.org/drawingml/2006/chart" xmlns:dgm="http://schemas.openxmlformats.org/drawingml/2006/diagram" xmlns:o="urn:schemas-microsoft-com:office:office" xmlns:v="urn:schemas-microsoft-com:vml" xmlns:pvml="urn:schemas-microsoft-com:office:powerpoint" xmlns:com="http://schemas.openxmlformats.org/drawingml/2006/compatibility" xmlns:p14="http://schemas.microsoft.com/office/powerpoint/2010/main" xmlns:p15="http://schemas.microsoft.com/office/powerpoint/2012/main" xmlns:ahyp="http://schemas.microsoft.com/office/drawing/2018/hyperlinkcolor" xmlns:go="http://customooxmlschemas.google.com/" r:id="rId54" roundtripDataSignature="AMtx7mhRAqkVhkxmJBd5mjEnvp0tEMTY6w=="/>
     </p:ext>
   </p:extLst>
 </p:presentation>
@@ -2708,19 +2709,7 @@
                 <a:cs typeface="Arial Narrow"/>
                 <a:sym typeface="Arial Narrow"/>
               </a:rPr>
-              <a:t>Funcionalidades</a:t>
-            </a:r>
-            <a:r>
-              <a:rPr lang="pt-BR" sz="1200" b="1" dirty="0" smtClean="0">
-                <a:solidFill>
-                  <a:schemeClr val="dk1"/>
-                </a:solidFill>
-                <a:latin typeface="Arial Narrow"/>
-                <a:ea typeface="Arial Narrow"/>
-                <a:cs typeface="Arial Narrow"/>
-                <a:sym typeface="Arial Narrow"/>
-              </a:rPr>
-              <a:t>: </a:t>
+              <a:t>Funcionalidades: </a:t>
             </a:r>
             <a:endParaRPr lang="pt-BR" sz="1200" b="1" dirty="0" smtClean="0">
               <a:solidFill>
@@ -3318,6 +3307,286 @@
   <p:cSld>
     <p:spTree>
       <p:nvGrpSpPr>
+        <p:cNvPr id="1" name="Shape 238"/>
+        <p:cNvGrpSpPr/>
+        <p:nvPr/>
+      </p:nvGrpSpPr>
+      <p:grpSpPr>
+        <a:xfrm>
+          <a:off x="0" y="0"/>
+          <a:ext cx="0" cy="0"/>
+          <a:chOff x="0" y="0"/>
+          <a:chExt cx="0" cy="0"/>
+        </a:xfrm>
+      </p:grpSpPr>
+      <p:sp>
+        <p:nvSpPr>
+          <p:cNvPr id="239" name="Google Shape;239;gede490e3ad_0_3905:notes"/>
+          <p:cNvSpPr>
+            <a:spLocks noGrp="1" noRot="1" noChangeAspect="1"/>
+          </p:cNvSpPr>
+          <p:nvPr>
+            <p:ph type="sldImg" idx="2"/>
+          </p:nvPr>
+        </p:nvSpPr>
+        <p:spPr>
+          <a:xfrm>
+            <a:off x="685800" y="1143000"/>
+            <a:ext cx="5486400" cy="3086100"/>
+          </a:xfrm>
+          <a:custGeom>
+            <a:avLst/>
+            <a:gdLst/>
+            <a:ahLst/>
+            <a:cxnLst/>
+            <a:rect l="l" t="t" r="r" b="b"/>
+            <a:pathLst>
+              <a:path w="120000" h="120000" extrusionOk="0">
+                <a:moveTo>
+                  <a:pt x="0" y="0"/>
+                </a:moveTo>
+                <a:lnTo>
+                  <a:pt x="120000" y="0"/>
+                </a:lnTo>
+                <a:lnTo>
+                  <a:pt x="120000" y="120000"/>
+                </a:lnTo>
+                <a:lnTo>
+                  <a:pt x="0" y="120000"/>
+                </a:lnTo>
+                <a:close/>
+              </a:path>
+            </a:pathLst>
+          </a:custGeom>
+          <a:noFill/>
+          <a:ln w="12700" cap="flat" cmpd="sng">
+            <a:solidFill>
+              <a:srgbClr val="000000"/>
+            </a:solidFill>
+            <a:prstDash val="solid"/>
+            <a:round/>
+            <a:headEnd type="none" w="sm" len="sm"/>
+            <a:tailEnd type="none" w="sm" len="sm"/>
+          </a:ln>
+        </p:spPr>
+      </p:sp>
+      <p:sp>
+        <p:nvSpPr>
+          <p:cNvPr id="240" name="Google Shape;240;gede490e3ad_0_3905:notes"/>
+          <p:cNvSpPr txBox="1">
+            <a:spLocks noGrp="1"/>
+          </p:cNvSpPr>
+          <p:nvPr>
+            <p:ph type="body" idx="1"/>
+          </p:nvPr>
+        </p:nvSpPr>
+        <p:spPr>
+          <a:xfrm>
+            <a:off x="685800" y="4400550"/>
+            <a:ext cx="5486400" cy="3600600"/>
+          </a:xfrm>
+          <a:prstGeom prst="rect">
+            <a:avLst/>
+          </a:prstGeom>
+          <a:noFill/>
+          <a:ln>
+            <a:noFill/>
+          </a:ln>
+        </p:spPr>
+        <p:txBody>
+          <a:bodyPr spcFirstLastPara="1" wrap="square" lIns="91425" tIns="45700" rIns="91425" bIns="45700" anchor="t" anchorCtr="0">
+            <a:noAutofit/>
+          </a:bodyPr>
+          <a:lstStyle/>
+          <a:p>
+            <a:pPr marL="171450" lvl="0" indent="-171450" algn="l" rtl="0">
+              <a:spcBef>
+                <a:spcPts val="0"/>
+              </a:spcBef>
+              <a:spcAft>
+                <a:spcPts val="0"/>
+              </a:spcAft>
+              <a:buFontTx/>
+              <a:buChar char="-"/>
+            </a:pPr>
+            <a:r>
+              <a:rPr lang="pt-BR" dirty="0" smtClean="0"/>
+              <a:t>Setup das máquinas para publicação de dados abertos: https://github.com/dados-mg/dados-mg.github.io/blob/form-ckan/setup-maquina-windows.md (canais de comunicação com os </a:t>
+            </a:r>
+            <a:r>
+              <a:rPr lang="pt-BR" dirty="0" err="1" smtClean="0"/>
+              <a:t>custodiantes</a:t>
+            </a:r>
+            <a:r>
+              <a:rPr lang="pt-BR" dirty="0" smtClean="0"/>
+              <a:t>: </a:t>
+            </a:r>
+            <a:r>
+              <a:rPr lang="pt-BR" dirty="0" err="1" smtClean="0"/>
+              <a:t>Teams</a:t>
+            </a:r>
+            <a:r>
+              <a:rPr lang="pt-BR" dirty="0" smtClean="0"/>
+              <a:t> e </a:t>
+            </a:r>
+            <a:r>
+              <a:rPr lang="pt-BR" dirty="0" err="1" smtClean="0"/>
+              <a:t>Github</a:t>
+            </a:r>
+            <a:r>
+              <a:rPr lang="pt-BR" dirty="0" smtClean="0"/>
+              <a:t>)</a:t>
+            </a:r>
+          </a:p>
+          <a:p>
+            <a:pPr marL="171450" lvl="0" indent="-171450" algn="l" rtl="0">
+              <a:spcBef>
+                <a:spcPts val="0"/>
+              </a:spcBef>
+              <a:spcAft>
+                <a:spcPts val="0"/>
+              </a:spcAft>
+              <a:buFontTx/>
+              <a:buChar char="-"/>
+            </a:pPr>
+            <a:endParaRPr lang="pt-BR" dirty="0" smtClean="0"/>
+          </a:p>
+          <a:p>
+            <a:pPr marL="171450" lvl="0" indent="-171450" algn="l" rtl="0">
+              <a:spcBef>
+                <a:spcPts val="0"/>
+              </a:spcBef>
+              <a:spcAft>
+                <a:spcPts val="0"/>
+              </a:spcAft>
+              <a:buFontTx/>
+              <a:buChar char="-"/>
+            </a:pPr>
+            <a:r>
+              <a:rPr lang="pt-BR" dirty="0" smtClean="0"/>
+              <a:t>Formulário de cadastro de usuário: https://github.com/dados-mg/dados-mg.github.io/blob/form-ckan/cadastro-usuario.md</a:t>
+            </a:r>
+          </a:p>
+          <a:p>
+            <a:pPr marL="171450" lvl="0" indent="-171450" algn="l" rtl="0">
+              <a:spcBef>
+                <a:spcPts val="0"/>
+              </a:spcBef>
+              <a:spcAft>
+                <a:spcPts val="0"/>
+              </a:spcAft>
+              <a:buFontTx/>
+              <a:buChar char="-"/>
+            </a:pPr>
+            <a:endParaRPr lang="pt-BR" dirty="0" smtClean="0"/>
+          </a:p>
+          <a:p>
+            <a:pPr marL="171450" lvl="0" indent="-171450" algn="l" rtl="0">
+              <a:spcBef>
+                <a:spcPts val="0"/>
+              </a:spcBef>
+              <a:spcAft>
+                <a:spcPts val="0"/>
+              </a:spcAft>
+              <a:buFontTx/>
+              <a:buChar char="-"/>
+            </a:pPr>
+            <a:r>
+              <a:rPr lang="pt-BR" dirty="0" smtClean="0"/>
+              <a:t>Termo</a:t>
+            </a:r>
+            <a:r>
+              <a:rPr lang="pt-BR" baseline="0" dirty="0" smtClean="0"/>
+              <a:t> de adesão ao </a:t>
+            </a:r>
+            <a:r>
+              <a:rPr lang="pt-BR" baseline="0" dirty="0" err="1" smtClean="0"/>
+              <a:t>PdA</a:t>
+            </a:r>
+            <a:r>
+              <a:rPr lang="pt-BR" baseline="0" dirty="0" smtClean="0"/>
+              <a:t>: https://github.com/dados-mg/dados-mg.github.io/blob/form-ckan/termo-adesao-PdA.md</a:t>
+            </a:r>
+          </a:p>
+          <a:p>
+            <a:pPr marL="171450" lvl="0" indent="-171450" algn="l" rtl="0">
+              <a:spcBef>
+                <a:spcPts val="0"/>
+              </a:spcBef>
+              <a:spcAft>
+                <a:spcPts val="0"/>
+              </a:spcAft>
+              <a:buFontTx/>
+              <a:buChar char="-"/>
+            </a:pPr>
+            <a:endParaRPr dirty="0"/>
+          </a:p>
+        </p:txBody>
+      </p:sp>
+      <p:sp>
+        <p:nvSpPr>
+          <p:cNvPr id="241" name="Google Shape;241;gede490e3ad_0_3905:notes"/>
+          <p:cNvSpPr txBox="1">
+            <a:spLocks noGrp="1"/>
+          </p:cNvSpPr>
+          <p:nvPr>
+            <p:ph type="sldNum" idx="12"/>
+          </p:nvPr>
+        </p:nvSpPr>
+        <p:spPr>
+          <a:xfrm>
+            <a:off x="3884613" y="8685213"/>
+            <a:ext cx="2971800" cy="458700"/>
+          </a:xfrm>
+          <a:prstGeom prst="rect">
+            <a:avLst/>
+          </a:prstGeom>
+          <a:noFill/>
+          <a:ln>
+            <a:noFill/>
+          </a:ln>
+        </p:spPr>
+        <p:txBody>
+          <a:bodyPr spcFirstLastPara="1" wrap="square" lIns="91425" tIns="45700" rIns="91425" bIns="45700" anchor="b" anchorCtr="0">
+            <a:noAutofit/>
+          </a:bodyPr>
+          <a:lstStyle/>
+          <a:p>
+            <a:pPr marL="0" lvl="0" indent="0" algn="r" rtl="0">
+              <a:spcBef>
+                <a:spcPts val="0"/>
+              </a:spcBef>
+              <a:spcAft>
+                <a:spcPts val="0"/>
+              </a:spcAft>
+              <a:buNone/>
+            </a:pPr>
+            <a:fld id="{00000000-1234-1234-1234-123412341234}" type="slidenum">
+              <a:rPr lang="pt-BR"/>
+              <a:t>16</a:t>
+            </a:fld>
+            <a:endParaRPr/>
+          </a:p>
+        </p:txBody>
+      </p:sp>
+    </p:spTree>
+    <p:extLst>
+      <p:ext uri="{BB962C8B-B14F-4D97-AF65-F5344CB8AC3E}">
+        <p14:creationId xmlns:p14="http://schemas.microsoft.com/office/powerpoint/2010/main" val="497364174"/>
+      </p:ext>
+    </p:extLst>
+  </p:cSld>
+  <p:clrMapOvr>
+    <a:masterClrMapping/>
+  </p:clrMapOvr>
+</p:notes>
+</file>
+
+<file path=ppt/notesSlides/notesSlide17.xml><?xml version="1.0" encoding="utf-8"?>
+<p:notes xmlns:a="http://schemas.openxmlformats.org/drawingml/2006/main" xmlns:r="http://schemas.openxmlformats.org/officeDocument/2006/relationships" xmlns:p="http://schemas.openxmlformats.org/presentationml/2006/main" showMasterSp="0" showMasterPhAnim="0">
+  <p:cSld>
+    <p:spTree>
+      <p:nvGrpSpPr>
         <p:cNvPr id="1" name="Shape 270"/>
         <p:cNvGrpSpPr/>
         <p:nvPr/>
@@ -3547,7 +3816,7 @@
             </a:pPr>
             <a:fld id="{00000000-1234-1234-1234-123412341234}" type="slidenum">
               <a:rPr lang="pt-BR"/>
-              <a:t>16</a:t>
+              <a:t>17</a:t>
             </a:fld>
             <a:endParaRPr/>
           </a:p>
@@ -3561,7 +3830,7 @@
 </p:notes>
 </file>
 
-<file path=ppt/notesSlides/notesSlide17.xml><?xml version="1.0" encoding="utf-8"?>
+<file path=ppt/notesSlides/notesSlide18.xml><?xml version="1.0" encoding="utf-8"?>
 <p:notes xmlns:a="http://schemas.openxmlformats.org/drawingml/2006/main" xmlns:r="http://schemas.openxmlformats.org/officeDocument/2006/relationships" xmlns:p="http://schemas.openxmlformats.org/presentationml/2006/main" showMasterSp="0" showMasterPhAnim="0">
   <p:cSld>
     <p:spTree>
@@ -3844,7 +4113,7 @@
             </a:pPr>
             <a:fld id="{00000000-1234-1234-1234-123412341234}" type="slidenum">
               <a:rPr lang="pt-BR"/>
-              <a:t>17</a:t>
+              <a:t>18</a:t>
             </a:fld>
             <a:endParaRPr/>
           </a:p>
@@ -3858,7 +4127,7 @@
 </p:notes>
 </file>
 
-<file path=ppt/notesSlides/notesSlide18.xml><?xml version="1.0" encoding="utf-8"?>
+<file path=ppt/notesSlides/notesSlide19.xml><?xml version="1.0" encoding="utf-8"?>
 <p:notes xmlns:a="http://schemas.openxmlformats.org/drawingml/2006/main" xmlns:r="http://schemas.openxmlformats.org/officeDocument/2006/relationships" xmlns:p="http://schemas.openxmlformats.org/presentationml/2006/main" showMasterSp="0" showMasterPhAnim="0">
   <p:cSld>
     <p:spTree>
@@ -4144,394 +4413,6 @@
       <p:sp>
         <p:nvSpPr>
           <p:cNvPr id="326" name="Google Shape;326;gede490e3ad_0_4188:notes"/>
-          <p:cNvSpPr txBox="1">
-            <a:spLocks noGrp="1"/>
-          </p:cNvSpPr>
-          <p:nvPr>
-            <p:ph type="sldNum" idx="12"/>
-          </p:nvPr>
-        </p:nvSpPr>
-        <p:spPr>
-          <a:xfrm>
-            <a:off x="3884613" y="8685213"/>
-            <a:ext cx="2971800" cy="458700"/>
-          </a:xfrm>
-          <a:prstGeom prst="rect">
-            <a:avLst/>
-          </a:prstGeom>
-          <a:noFill/>
-          <a:ln>
-            <a:noFill/>
-          </a:ln>
-        </p:spPr>
-        <p:txBody>
-          <a:bodyPr spcFirstLastPara="1" wrap="square" lIns="91425" tIns="45700" rIns="91425" bIns="45700" anchor="b" anchorCtr="0">
-            <a:noAutofit/>
-          </a:bodyPr>
-          <a:lstStyle/>
-          <a:p>
-            <a:pPr marL="0" lvl="0" indent="0" algn="r" rtl="0">
-              <a:spcBef>
-                <a:spcPts val="0"/>
-              </a:spcBef>
-              <a:spcAft>
-                <a:spcPts val="0"/>
-              </a:spcAft>
-              <a:buNone/>
-            </a:pPr>
-            <a:fld id="{00000000-1234-1234-1234-123412341234}" type="slidenum">
-              <a:rPr lang="pt-BR"/>
-              <a:t>18</a:t>
-            </a:fld>
-            <a:endParaRPr/>
-          </a:p>
-        </p:txBody>
-      </p:sp>
-    </p:spTree>
-  </p:cSld>
-  <p:clrMapOvr>
-    <a:masterClrMapping/>
-  </p:clrMapOvr>
-</p:notes>
-</file>
-
-<file path=ppt/notesSlides/notesSlide19.xml><?xml version="1.0" encoding="utf-8"?>
-<p:notes xmlns:a="http://schemas.openxmlformats.org/drawingml/2006/main" xmlns:r="http://schemas.openxmlformats.org/officeDocument/2006/relationships" xmlns:p="http://schemas.openxmlformats.org/presentationml/2006/main" showMasterSp="0" showMasterPhAnim="0">
-  <p:cSld>
-    <p:spTree>
-      <p:nvGrpSpPr>
-        <p:cNvPr id="1" name="Shape 331"/>
-        <p:cNvGrpSpPr/>
-        <p:nvPr/>
-      </p:nvGrpSpPr>
-      <p:grpSpPr>
-        <a:xfrm>
-          <a:off x="0" y="0"/>
-          <a:ext cx="0" cy="0"/>
-          <a:chOff x="0" y="0"/>
-          <a:chExt cx="0" cy="0"/>
-        </a:xfrm>
-      </p:grpSpPr>
-      <p:sp>
-        <p:nvSpPr>
-          <p:cNvPr id="332" name="Google Shape;332;gede490e3ad_0_4208:notes"/>
-          <p:cNvSpPr>
-            <a:spLocks noGrp="1" noRot="1" noChangeAspect="1"/>
-          </p:cNvSpPr>
-          <p:nvPr>
-            <p:ph type="sldImg" idx="2"/>
-          </p:nvPr>
-        </p:nvSpPr>
-        <p:spPr>
-          <a:xfrm>
-            <a:off x="685800" y="1143000"/>
-            <a:ext cx="5486400" cy="3086100"/>
-          </a:xfrm>
-          <a:custGeom>
-            <a:avLst/>
-            <a:gdLst/>
-            <a:ahLst/>
-            <a:cxnLst/>
-            <a:rect l="l" t="t" r="r" b="b"/>
-            <a:pathLst>
-              <a:path w="120000" h="120000" extrusionOk="0">
-                <a:moveTo>
-                  <a:pt x="0" y="0"/>
-                </a:moveTo>
-                <a:lnTo>
-                  <a:pt x="120000" y="0"/>
-                </a:lnTo>
-                <a:lnTo>
-                  <a:pt x="120000" y="120000"/>
-                </a:lnTo>
-                <a:lnTo>
-                  <a:pt x="0" y="120000"/>
-                </a:lnTo>
-                <a:close/>
-              </a:path>
-            </a:pathLst>
-          </a:custGeom>
-          <a:noFill/>
-          <a:ln w="12700" cap="flat" cmpd="sng">
-            <a:solidFill>
-              <a:srgbClr val="000000"/>
-            </a:solidFill>
-            <a:prstDash val="solid"/>
-            <a:round/>
-            <a:headEnd type="none" w="sm" len="sm"/>
-            <a:tailEnd type="none" w="sm" len="sm"/>
-          </a:ln>
-        </p:spPr>
-      </p:sp>
-      <p:sp>
-        <p:nvSpPr>
-          <p:cNvPr id="333" name="Google Shape;333;gede490e3ad_0_4208:notes"/>
-          <p:cNvSpPr txBox="1">
-            <a:spLocks noGrp="1"/>
-          </p:cNvSpPr>
-          <p:nvPr>
-            <p:ph type="body" idx="1"/>
-          </p:nvPr>
-        </p:nvSpPr>
-        <p:spPr>
-          <a:xfrm>
-            <a:off x="685800" y="4400550"/>
-            <a:ext cx="5486400" cy="3600600"/>
-          </a:xfrm>
-          <a:prstGeom prst="rect">
-            <a:avLst/>
-          </a:prstGeom>
-          <a:noFill/>
-          <a:ln>
-            <a:noFill/>
-          </a:ln>
-        </p:spPr>
-        <p:txBody>
-          <a:bodyPr spcFirstLastPara="1" wrap="square" lIns="91425" tIns="45700" rIns="91425" bIns="45700" anchor="t" anchorCtr="0">
-            <a:noAutofit/>
-          </a:bodyPr>
-          <a:lstStyle/>
-          <a:p>
-            <a:pPr marL="0" lvl="0" indent="0" algn="l" rtl="0">
-              <a:spcBef>
-                <a:spcPts val="0"/>
-              </a:spcBef>
-              <a:spcAft>
-                <a:spcPts val="0"/>
-              </a:spcAft>
-              <a:buNone/>
-            </a:pPr>
-            <a:r>
-              <a:rPr lang="pt-BR"/>
-              <a:t>Para oferecer informação integra aos usuários. </a:t>
-            </a:r>
-            <a:endParaRPr/>
-          </a:p>
-          <a:p>
-            <a:pPr marL="0" lvl="0" indent="0" algn="l" rtl="0">
-              <a:spcBef>
-                <a:spcPts val="0"/>
-              </a:spcBef>
-              <a:spcAft>
-                <a:spcPts val="0"/>
-              </a:spcAft>
-              <a:buNone/>
-            </a:pPr>
-            <a:r>
-              <a:rPr lang="pt-BR"/>
-              <a:t>Exemplos: padronização do formato de datas; inclusão de colunas para padronização do layout dos arquivos.</a:t>
-            </a:r>
-            <a:endParaRPr/>
-          </a:p>
-          <a:p>
-            <a:pPr marL="0" lvl="0" indent="0" algn="l" rtl="0">
-              <a:spcBef>
-                <a:spcPts val="0"/>
-              </a:spcBef>
-              <a:spcAft>
-                <a:spcPts val="0"/>
-              </a:spcAft>
-              <a:buNone/>
-            </a:pPr>
-            <a:endParaRPr/>
-          </a:p>
-          <a:p>
-            <a:pPr marL="171450" lvl="0" indent="-171450" algn="l" rtl="0">
-              <a:spcBef>
-                <a:spcPts val="0"/>
-              </a:spcBef>
-              <a:spcAft>
-                <a:spcPts val="0"/>
-              </a:spcAft>
-              <a:buClr>
-                <a:schemeClr val="dk1"/>
-              </a:buClr>
-              <a:buSzPts val="1200"/>
-              <a:buFont typeface="Calibri"/>
-              <a:buChar char="-"/>
-            </a:pPr>
-            <a:r>
-              <a:rPr lang="pt-BR"/>
-              <a:t>ex: inadequações planilha remuneração:</a:t>
-            </a:r>
-            <a:br>
-              <a:rPr lang="pt-BR"/>
-            </a:br>
-            <a:endParaRPr/>
-          </a:p>
-          <a:p>
-            <a:pPr marL="171450" lvl="0" indent="-171450" algn="l" rtl="0">
-              <a:spcBef>
-                <a:spcPts val="0"/>
-              </a:spcBef>
-              <a:spcAft>
-                <a:spcPts val="0"/>
-              </a:spcAft>
-              <a:buClr>
-                <a:schemeClr val="dk1"/>
-              </a:buClr>
-              <a:buSzPts val="1200"/>
-              <a:buFont typeface="Calibri"/>
-              <a:buChar char="-"/>
-            </a:pPr>
-            <a:r>
-              <a:rPr lang="pt-BR"/>
-              <a:t>Valor do SD 1 CL segunda coluna;</a:t>
-            </a:r>
-            <a:endParaRPr/>
-          </a:p>
-          <a:p>
-            <a:pPr marL="171450" lvl="0" indent="-171450" algn="l" rtl="0">
-              <a:spcBef>
-                <a:spcPts val="0"/>
-              </a:spcBef>
-              <a:spcAft>
-                <a:spcPts val="0"/>
-              </a:spcAft>
-              <a:buClr>
-                <a:schemeClr val="dk1"/>
-              </a:buClr>
-              <a:buSzPts val="1200"/>
-              <a:buFont typeface="Calibri"/>
-              <a:buChar char="-"/>
-            </a:pPr>
-            <a:r>
-              <a:rPr lang="pt-BR"/>
-              <a:t>Valores zero, vazios e sim na terceira coluna;</a:t>
-            </a:r>
-            <a:endParaRPr/>
-          </a:p>
-          <a:p>
-            <a:pPr marL="171450" lvl="0" indent="-171450" algn="l" rtl="0">
-              <a:spcBef>
-                <a:spcPts val="0"/>
-              </a:spcBef>
-              <a:spcAft>
-                <a:spcPts val="0"/>
-              </a:spcAft>
-              <a:buClr>
-                <a:schemeClr val="dk1"/>
-              </a:buClr>
-              <a:buSzPts val="1200"/>
-              <a:buFont typeface="Calibri"/>
-              <a:buChar char="-"/>
-            </a:pPr>
-            <a:r>
-              <a:rPr lang="pt-BR"/>
-              <a:t>CBMMG abreviado e outros por extenso na quinta coluna;</a:t>
-            </a:r>
-            <a:endParaRPr/>
-          </a:p>
-          <a:p>
-            <a:pPr marL="171450" lvl="0" indent="-171450" algn="l" rtl="0">
-              <a:spcBef>
-                <a:spcPts val="0"/>
-              </a:spcBef>
-              <a:spcAft>
-                <a:spcPts val="0"/>
-              </a:spcAft>
-              <a:buClr>
-                <a:schemeClr val="dk1"/>
-              </a:buClr>
-              <a:buSzPts val="1200"/>
-              <a:buFont typeface="Calibri"/>
-              <a:buChar char="-"/>
-            </a:pPr>
-            <a:r>
-              <a:rPr lang="pt-BR"/>
-              <a:t>Formatos de número para carga horária, remuneração e data</a:t>
-            </a:r>
-            <a:endParaRPr/>
-          </a:p>
-          <a:p>
-            <a:pPr marL="171450" lvl="0" indent="-95250" algn="l" rtl="0">
-              <a:spcBef>
-                <a:spcPts val="0"/>
-              </a:spcBef>
-              <a:spcAft>
-                <a:spcPts val="0"/>
-              </a:spcAft>
-              <a:buClr>
-                <a:schemeClr val="dk1"/>
-              </a:buClr>
-              <a:buSzPts val="1200"/>
-              <a:buFont typeface="Calibri"/>
-              <a:buNone/>
-            </a:pPr>
-            <a:endParaRPr/>
-          </a:p>
-          <a:p>
-            <a:pPr marL="171450" lvl="0" indent="-171450" algn="l" rtl="0">
-              <a:spcBef>
-                <a:spcPts val="0"/>
-              </a:spcBef>
-              <a:spcAft>
-                <a:spcPts val="0"/>
-              </a:spcAft>
-              <a:buClr>
-                <a:schemeClr val="dk1"/>
-              </a:buClr>
-              <a:buSzPts val="1200"/>
-              <a:buFont typeface="Calibri"/>
-              <a:buChar char="-"/>
-            </a:pPr>
-            <a:r>
-              <a:rPr lang="pt-BR"/>
-              <a:t>Limpeza (guia sugestivo de problemas comuns por responsável) = https://escoladedados.org/tutoriais/guia-quartz-para-limpeza-de-dados/</a:t>
-            </a:r>
-            <a:endParaRPr/>
-          </a:p>
-          <a:p>
-            <a:pPr marL="171450" lvl="0" indent="-95250" algn="l" rtl="0">
-              <a:spcBef>
-                <a:spcPts val="0"/>
-              </a:spcBef>
-              <a:spcAft>
-                <a:spcPts val="0"/>
-              </a:spcAft>
-              <a:buClr>
-                <a:schemeClr val="dk1"/>
-              </a:buClr>
-              <a:buSzPts val="1200"/>
-              <a:buFont typeface="Calibri"/>
-              <a:buNone/>
-            </a:pPr>
-            <a:endParaRPr/>
-          </a:p>
-          <a:p>
-            <a:pPr marL="628650" lvl="1" indent="-95250" algn="l" rtl="0">
-              <a:spcBef>
-                <a:spcPts val="0"/>
-              </a:spcBef>
-              <a:spcAft>
-                <a:spcPts val="0"/>
-              </a:spcAft>
-              <a:buClr>
-                <a:schemeClr val="dk1"/>
-              </a:buClr>
-              <a:buSzPts val="1200"/>
-              <a:buFont typeface="Calibri"/>
-              <a:buNone/>
-            </a:pPr>
-            <a:endParaRPr/>
-          </a:p>
-          <a:p>
-            <a:pPr marL="0" lvl="0" indent="0" algn="l" rtl="0">
-              <a:spcBef>
-                <a:spcPts val="0"/>
-              </a:spcBef>
-              <a:spcAft>
-                <a:spcPts val="0"/>
-              </a:spcAft>
-              <a:buNone/>
-            </a:pPr>
-            <a:endParaRPr/>
-          </a:p>
-        </p:txBody>
-      </p:sp>
-      <p:sp>
-        <p:nvSpPr>
-          <p:cNvPr id="334" name="Google Shape;334;gede490e3ad_0_4208:notes"/>
           <p:cNvSpPr txBox="1">
             <a:spLocks noGrp="1"/>
           </p:cNvSpPr>
@@ -4856,6 +4737,394 @@
   <p:cSld>
     <p:spTree>
       <p:nvGrpSpPr>
+        <p:cNvPr id="1" name="Shape 331"/>
+        <p:cNvGrpSpPr/>
+        <p:nvPr/>
+      </p:nvGrpSpPr>
+      <p:grpSpPr>
+        <a:xfrm>
+          <a:off x="0" y="0"/>
+          <a:ext cx="0" cy="0"/>
+          <a:chOff x="0" y="0"/>
+          <a:chExt cx="0" cy="0"/>
+        </a:xfrm>
+      </p:grpSpPr>
+      <p:sp>
+        <p:nvSpPr>
+          <p:cNvPr id="332" name="Google Shape;332;gede490e3ad_0_4208:notes"/>
+          <p:cNvSpPr>
+            <a:spLocks noGrp="1" noRot="1" noChangeAspect="1"/>
+          </p:cNvSpPr>
+          <p:nvPr>
+            <p:ph type="sldImg" idx="2"/>
+          </p:nvPr>
+        </p:nvSpPr>
+        <p:spPr>
+          <a:xfrm>
+            <a:off x="685800" y="1143000"/>
+            <a:ext cx="5486400" cy="3086100"/>
+          </a:xfrm>
+          <a:custGeom>
+            <a:avLst/>
+            <a:gdLst/>
+            <a:ahLst/>
+            <a:cxnLst/>
+            <a:rect l="l" t="t" r="r" b="b"/>
+            <a:pathLst>
+              <a:path w="120000" h="120000" extrusionOk="0">
+                <a:moveTo>
+                  <a:pt x="0" y="0"/>
+                </a:moveTo>
+                <a:lnTo>
+                  <a:pt x="120000" y="0"/>
+                </a:lnTo>
+                <a:lnTo>
+                  <a:pt x="120000" y="120000"/>
+                </a:lnTo>
+                <a:lnTo>
+                  <a:pt x="0" y="120000"/>
+                </a:lnTo>
+                <a:close/>
+              </a:path>
+            </a:pathLst>
+          </a:custGeom>
+          <a:noFill/>
+          <a:ln w="12700" cap="flat" cmpd="sng">
+            <a:solidFill>
+              <a:srgbClr val="000000"/>
+            </a:solidFill>
+            <a:prstDash val="solid"/>
+            <a:round/>
+            <a:headEnd type="none" w="sm" len="sm"/>
+            <a:tailEnd type="none" w="sm" len="sm"/>
+          </a:ln>
+        </p:spPr>
+      </p:sp>
+      <p:sp>
+        <p:nvSpPr>
+          <p:cNvPr id="333" name="Google Shape;333;gede490e3ad_0_4208:notes"/>
+          <p:cNvSpPr txBox="1">
+            <a:spLocks noGrp="1"/>
+          </p:cNvSpPr>
+          <p:nvPr>
+            <p:ph type="body" idx="1"/>
+          </p:nvPr>
+        </p:nvSpPr>
+        <p:spPr>
+          <a:xfrm>
+            <a:off x="685800" y="4400550"/>
+            <a:ext cx="5486400" cy="3600600"/>
+          </a:xfrm>
+          <a:prstGeom prst="rect">
+            <a:avLst/>
+          </a:prstGeom>
+          <a:noFill/>
+          <a:ln>
+            <a:noFill/>
+          </a:ln>
+        </p:spPr>
+        <p:txBody>
+          <a:bodyPr spcFirstLastPara="1" wrap="square" lIns="91425" tIns="45700" rIns="91425" bIns="45700" anchor="t" anchorCtr="0">
+            <a:noAutofit/>
+          </a:bodyPr>
+          <a:lstStyle/>
+          <a:p>
+            <a:pPr marL="0" lvl="0" indent="0" algn="l" rtl="0">
+              <a:spcBef>
+                <a:spcPts val="0"/>
+              </a:spcBef>
+              <a:spcAft>
+                <a:spcPts val="0"/>
+              </a:spcAft>
+              <a:buNone/>
+            </a:pPr>
+            <a:r>
+              <a:rPr lang="pt-BR"/>
+              <a:t>Para oferecer informação integra aos usuários. </a:t>
+            </a:r>
+            <a:endParaRPr/>
+          </a:p>
+          <a:p>
+            <a:pPr marL="0" lvl="0" indent="0" algn="l" rtl="0">
+              <a:spcBef>
+                <a:spcPts val="0"/>
+              </a:spcBef>
+              <a:spcAft>
+                <a:spcPts val="0"/>
+              </a:spcAft>
+              <a:buNone/>
+            </a:pPr>
+            <a:r>
+              <a:rPr lang="pt-BR"/>
+              <a:t>Exemplos: padronização do formato de datas; inclusão de colunas para padronização do layout dos arquivos.</a:t>
+            </a:r>
+            <a:endParaRPr/>
+          </a:p>
+          <a:p>
+            <a:pPr marL="0" lvl="0" indent="0" algn="l" rtl="0">
+              <a:spcBef>
+                <a:spcPts val="0"/>
+              </a:spcBef>
+              <a:spcAft>
+                <a:spcPts val="0"/>
+              </a:spcAft>
+              <a:buNone/>
+            </a:pPr>
+            <a:endParaRPr/>
+          </a:p>
+          <a:p>
+            <a:pPr marL="171450" lvl="0" indent="-171450" algn="l" rtl="0">
+              <a:spcBef>
+                <a:spcPts val="0"/>
+              </a:spcBef>
+              <a:spcAft>
+                <a:spcPts val="0"/>
+              </a:spcAft>
+              <a:buClr>
+                <a:schemeClr val="dk1"/>
+              </a:buClr>
+              <a:buSzPts val="1200"/>
+              <a:buFont typeface="Calibri"/>
+              <a:buChar char="-"/>
+            </a:pPr>
+            <a:r>
+              <a:rPr lang="pt-BR"/>
+              <a:t>ex: inadequações planilha remuneração:</a:t>
+            </a:r>
+            <a:br>
+              <a:rPr lang="pt-BR"/>
+            </a:br>
+            <a:endParaRPr/>
+          </a:p>
+          <a:p>
+            <a:pPr marL="171450" lvl="0" indent="-171450" algn="l" rtl="0">
+              <a:spcBef>
+                <a:spcPts val="0"/>
+              </a:spcBef>
+              <a:spcAft>
+                <a:spcPts val="0"/>
+              </a:spcAft>
+              <a:buClr>
+                <a:schemeClr val="dk1"/>
+              </a:buClr>
+              <a:buSzPts val="1200"/>
+              <a:buFont typeface="Calibri"/>
+              <a:buChar char="-"/>
+            </a:pPr>
+            <a:r>
+              <a:rPr lang="pt-BR"/>
+              <a:t>Valor do SD 1 CL segunda coluna;</a:t>
+            </a:r>
+            <a:endParaRPr/>
+          </a:p>
+          <a:p>
+            <a:pPr marL="171450" lvl="0" indent="-171450" algn="l" rtl="0">
+              <a:spcBef>
+                <a:spcPts val="0"/>
+              </a:spcBef>
+              <a:spcAft>
+                <a:spcPts val="0"/>
+              </a:spcAft>
+              <a:buClr>
+                <a:schemeClr val="dk1"/>
+              </a:buClr>
+              <a:buSzPts val="1200"/>
+              <a:buFont typeface="Calibri"/>
+              <a:buChar char="-"/>
+            </a:pPr>
+            <a:r>
+              <a:rPr lang="pt-BR"/>
+              <a:t>Valores zero, vazios e sim na terceira coluna;</a:t>
+            </a:r>
+            <a:endParaRPr/>
+          </a:p>
+          <a:p>
+            <a:pPr marL="171450" lvl="0" indent="-171450" algn="l" rtl="0">
+              <a:spcBef>
+                <a:spcPts val="0"/>
+              </a:spcBef>
+              <a:spcAft>
+                <a:spcPts val="0"/>
+              </a:spcAft>
+              <a:buClr>
+                <a:schemeClr val="dk1"/>
+              </a:buClr>
+              <a:buSzPts val="1200"/>
+              <a:buFont typeface="Calibri"/>
+              <a:buChar char="-"/>
+            </a:pPr>
+            <a:r>
+              <a:rPr lang="pt-BR"/>
+              <a:t>CBMMG abreviado e outros por extenso na quinta coluna;</a:t>
+            </a:r>
+            <a:endParaRPr/>
+          </a:p>
+          <a:p>
+            <a:pPr marL="171450" lvl="0" indent="-171450" algn="l" rtl="0">
+              <a:spcBef>
+                <a:spcPts val="0"/>
+              </a:spcBef>
+              <a:spcAft>
+                <a:spcPts val="0"/>
+              </a:spcAft>
+              <a:buClr>
+                <a:schemeClr val="dk1"/>
+              </a:buClr>
+              <a:buSzPts val="1200"/>
+              <a:buFont typeface="Calibri"/>
+              <a:buChar char="-"/>
+            </a:pPr>
+            <a:r>
+              <a:rPr lang="pt-BR"/>
+              <a:t>Formatos de número para carga horária, remuneração e data</a:t>
+            </a:r>
+            <a:endParaRPr/>
+          </a:p>
+          <a:p>
+            <a:pPr marL="171450" lvl="0" indent="-95250" algn="l" rtl="0">
+              <a:spcBef>
+                <a:spcPts val="0"/>
+              </a:spcBef>
+              <a:spcAft>
+                <a:spcPts val="0"/>
+              </a:spcAft>
+              <a:buClr>
+                <a:schemeClr val="dk1"/>
+              </a:buClr>
+              <a:buSzPts val="1200"/>
+              <a:buFont typeface="Calibri"/>
+              <a:buNone/>
+            </a:pPr>
+            <a:endParaRPr/>
+          </a:p>
+          <a:p>
+            <a:pPr marL="171450" lvl="0" indent="-171450" algn="l" rtl="0">
+              <a:spcBef>
+                <a:spcPts val="0"/>
+              </a:spcBef>
+              <a:spcAft>
+                <a:spcPts val="0"/>
+              </a:spcAft>
+              <a:buClr>
+                <a:schemeClr val="dk1"/>
+              </a:buClr>
+              <a:buSzPts val="1200"/>
+              <a:buFont typeface="Calibri"/>
+              <a:buChar char="-"/>
+            </a:pPr>
+            <a:r>
+              <a:rPr lang="pt-BR"/>
+              <a:t>Limpeza (guia sugestivo de problemas comuns por responsável) = https://escoladedados.org/tutoriais/guia-quartz-para-limpeza-de-dados/</a:t>
+            </a:r>
+            <a:endParaRPr/>
+          </a:p>
+          <a:p>
+            <a:pPr marL="171450" lvl="0" indent="-95250" algn="l" rtl="0">
+              <a:spcBef>
+                <a:spcPts val="0"/>
+              </a:spcBef>
+              <a:spcAft>
+                <a:spcPts val="0"/>
+              </a:spcAft>
+              <a:buClr>
+                <a:schemeClr val="dk1"/>
+              </a:buClr>
+              <a:buSzPts val="1200"/>
+              <a:buFont typeface="Calibri"/>
+              <a:buNone/>
+            </a:pPr>
+            <a:endParaRPr/>
+          </a:p>
+          <a:p>
+            <a:pPr marL="628650" lvl="1" indent="-95250" algn="l" rtl="0">
+              <a:spcBef>
+                <a:spcPts val="0"/>
+              </a:spcBef>
+              <a:spcAft>
+                <a:spcPts val="0"/>
+              </a:spcAft>
+              <a:buClr>
+                <a:schemeClr val="dk1"/>
+              </a:buClr>
+              <a:buSzPts val="1200"/>
+              <a:buFont typeface="Calibri"/>
+              <a:buNone/>
+            </a:pPr>
+            <a:endParaRPr/>
+          </a:p>
+          <a:p>
+            <a:pPr marL="0" lvl="0" indent="0" algn="l" rtl="0">
+              <a:spcBef>
+                <a:spcPts val="0"/>
+              </a:spcBef>
+              <a:spcAft>
+                <a:spcPts val="0"/>
+              </a:spcAft>
+              <a:buNone/>
+            </a:pPr>
+            <a:endParaRPr/>
+          </a:p>
+        </p:txBody>
+      </p:sp>
+      <p:sp>
+        <p:nvSpPr>
+          <p:cNvPr id="334" name="Google Shape;334;gede490e3ad_0_4208:notes"/>
+          <p:cNvSpPr txBox="1">
+            <a:spLocks noGrp="1"/>
+          </p:cNvSpPr>
+          <p:nvPr>
+            <p:ph type="sldNum" idx="12"/>
+          </p:nvPr>
+        </p:nvSpPr>
+        <p:spPr>
+          <a:xfrm>
+            <a:off x="3884613" y="8685213"/>
+            <a:ext cx="2971800" cy="458700"/>
+          </a:xfrm>
+          <a:prstGeom prst="rect">
+            <a:avLst/>
+          </a:prstGeom>
+          <a:noFill/>
+          <a:ln>
+            <a:noFill/>
+          </a:ln>
+        </p:spPr>
+        <p:txBody>
+          <a:bodyPr spcFirstLastPara="1" wrap="square" lIns="91425" tIns="45700" rIns="91425" bIns="45700" anchor="b" anchorCtr="0">
+            <a:noAutofit/>
+          </a:bodyPr>
+          <a:lstStyle/>
+          <a:p>
+            <a:pPr marL="0" lvl="0" indent="0" algn="r" rtl="0">
+              <a:spcBef>
+                <a:spcPts val="0"/>
+              </a:spcBef>
+              <a:spcAft>
+                <a:spcPts val="0"/>
+              </a:spcAft>
+              <a:buNone/>
+            </a:pPr>
+            <a:fld id="{00000000-1234-1234-1234-123412341234}" type="slidenum">
+              <a:rPr lang="pt-BR"/>
+              <a:t>20</a:t>
+            </a:fld>
+            <a:endParaRPr/>
+          </a:p>
+        </p:txBody>
+      </p:sp>
+    </p:spTree>
+  </p:cSld>
+  <p:clrMapOvr>
+    <a:masterClrMapping/>
+  </p:clrMapOvr>
+</p:notes>
+</file>
+
+<file path=ppt/notesSlides/notesSlide21.xml><?xml version="1.0" encoding="utf-8"?>
+<p:notes xmlns:a="http://schemas.openxmlformats.org/drawingml/2006/main" xmlns:r="http://schemas.openxmlformats.org/officeDocument/2006/relationships" xmlns:p="http://schemas.openxmlformats.org/presentationml/2006/main" showMasterSp="0" showMasterPhAnim="0">
+  <p:cSld>
+    <p:spTree>
+      <p:nvGrpSpPr>
         <p:cNvPr id="1" name="Shape 343"/>
         <p:cNvGrpSpPr/>
         <p:nvPr/>
@@ -5087,7 +5356,7 @@
             </a:pPr>
             <a:fld id="{00000000-1234-1234-1234-123412341234}" type="slidenum">
               <a:rPr lang="pt-BR"/>
-              <a:t>20</a:t>
+              <a:t>21</a:t>
             </a:fld>
             <a:endParaRPr/>
           </a:p>
@@ -5101,7 +5370,7 @@
 </p:notes>
 </file>
 
-<file path=ppt/notesSlides/notesSlide21.xml><?xml version="1.0" encoding="utf-8"?>
+<file path=ppt/notesSlides/notesSlide22.xml><?xml version="1.0" encoding="utf-8"?>
 <p:notes xmlns:a="http://schemas.openxmlformats.org/drawingml/2006/main" xmlns:r="http://schemas.openxmlformats.org/officeDocument/2006/relationships" xmlns:p="http://schemas.openxmlformats.org/presentationml/2006/main" showMasterSp="0" showMasterPhAnim="0">
   <p:cSld>
     <p:spTree>
@@ -5457,7 +5726,7 @@
             </a:pPr>
             <a:fld id="{00000000-1234-1234-1234-123412341234}" type="slidenum">
               <a:rPr lang="pt-BR"/>
-              <a:t>21</a:t>
+              <a:t>22</a:t>
             </a:fld>
             <a:endParaRPr/>
           </a:p>
@@ -5471,7 +5740,7 @@
 </p:notes>
 </file>
 
-<file path=ppt/notesSlides/notesSlide22.xml><?xml version="1.0" encoding="utf-8"?>
+<file path=ppt/notesSlides/notesSlide23.xml><?xml version="1.0" encoding="utf-8"?>
 <p:notes xmlns:a="http://schemas.openxmlformats.org/drawingml/2006/main" xmlns:r="http://schemas.openxmlformats.org/officeDocument/2006/relationships" xmlns:p="http://schemas.openxmlformats.org/presentationml/2006/main" showMasterSp="0" showMasterPhAnim="0">
   <p:cSld>
     <p:spTree>
@@ -5681,7 +5950,7 @@
             </a:pPr>
             <a:fld id="{00000000-1234-1234-1234-123412341234}" type="slidenum">
               <a:rPr lang="pt-BR"/>
-              <a:t>22</a:t>
+              <a:t>23</a:t>
             </a:fld>
             <a:endParaRPr/>
           </a:p>
@@ -5695,7 +5964,7 @@
 </p:notes>
 </file>
 
-<file path=ppt/notesSlides/notesSlide23.xml><?xml version="1.0" encoding="utf-8"?>
+<file path=ppt/notesSlides/notesSlide24.xml><?xml version="1.0" encoding="utf-8"?>
 <p:notes xmlns:a="http://schemas.openxmlformats.org/drawingml/2006/main" xmlns:r="http://schemas.openxmlformats.org/officeDocument/2006/relationships" xmlns:p="http://schemas.openxmlformats.org/presentationml/2006/main" showMasterSp="0" showMasterPhAnim="0">
   <p:cSld>
     <p:spTree>
@@ -5861,7 +6130,7 @@
             </a:pPr>
             <a:fld id="{00000000-1234-1234-1234-123412341234}" type="slidenum">
               <a:rPr lang="pt-BR"/>
-              <a:t>23</a:t>
+              <a:t>24</a:t>
             </a:fld>
             <a:endParaRPr/>
           </a:p>
@@ -5875,7 +6144,7 @@
 </p:notes>
 </file>
 
-<file path=ppt/notesSlides/notesSlide24.xml><?xml version="1.0" encoding="utf-8"?>
+<file path=ppt/notesSlides/notesSlide25.xml><?xml version="1.0" encoding="utf-8"?>
 <p:notes xmlns:a="http://schemas.openxmlformats.org/drawingml/2006/main" xmlns:r="http://schemas.openxmlformats.org/officeDocument/2006/relationships" xmlns:p="http://schemas.openxmlformats.org/presentationml/2006/main" showMasterSp="0" showMasterPhAnim="0">
   <p:cSld>
     <p:spTree>
@@ -6057,7 +6326,7 @@
             </a:pPr>
             <a:fld id="{00000000-1234-1234-1234-123412341234}" type="slidenum">
               <a:rPr lang="pt-BR"/>
-              <a:t>24</a:t>
+              <a:t>25</a:t>
             </a:fld>
             <a:endParaRPr/>
           </a:p>
@@ -6071,7 +6340,7 @@
 </p:notes>
 </file>
 
-<file path=ppt/notesSlides/notesSlide25.xml><?xml version="1.0" encoding="utf-8"?>
+<file path=ppt/notesSlides/notesSlide26.xml><?xml version="1.0" encoding="utf-8"?>
 <p:notes xmlns:a="http://schemas.openxmlformats.org/drawingml/2006/main" xmlns:r="http://schemas.openxmlformats.org/officeDocument/2006/relationships" xmlns:p="http://schemas.openxmlformats.org/presentationml/2006/main" showMasterSp="0" showMasterPhAnim="0">
   <p:cSld>
     <p:spTree>
@@ -6262,7 +6531,7 @@
             </a:pPr>
             <a:fld id="{00000000-1234-1234-1234-123412341234}" type="slidenum">
               <a:rPr lang="pt-BR"/>
-              <a:t>25</a:t>
+              <a:t>26</a:t>
             </a:fld>
             <a:endParaRPr/>
           </a:p>
@@ -6276,7 +6545,7 @@
 </p:notes>
 </file>
 
-<file path=ppt/notesSlides/notesSlide26.xml><?xml version="1.0" encoding="utf-8"?>
+<file path=ppt/notesSlides/notesSlide27.xml><?xml version="1.0" encoding="utf-8"?>
 <p:notes xmlns:a="http://schemas.openxmlformats.org/drawingml/2006/main" xmlns:r="http://schemas.openxmlformats.org/officeDocument/2006/relationships" xmlns:p="http://schemas.openxmlformats.org/presentationml/2006/main" showMasterSp="0" showMasterPhAnim="0">
   <p:cSld>
     <p:spTree>
@@ -6430,7 +6699,7 @@
             </a:pPr>
             <a:fld id="{00000000-1234-1234-1234-123412341234}" type="slidenum">
               <a:rPr lang="pt-BR"/>
-              <a:t>27</a:t>
+              <a:t>28</a:t>
             </a:fld>
             <a:endParaRPr/>
           </a:p>
@@ -7204,7 +7473,7 @@
                 <a:hlinkClick r:id="rId3">
                   <a:extLst>
                     <a:ext uri="{A12FA001-AC4F-418D-AE19-62706E023703}">
-                      <ahyp:hlinkClr xmlns:ahyp="http://schemas.microsoft.com/office/drawing/2018/hyperlinkcolor" xmlns:p15="http://schemas.microsoft.com/office/powerpoint/2012/main" xmlns:p14="http://schemas.microsoft.com/office/powerpoint/2010/main" xmlns:com="http://schemas.openxmlformats.org/drawingml/2006/compatibility" xmlns:pvml="urn:schemas-microsoft-com:office:powerpoint" xmlns:v="urn:schemas-microsoft-com:vml" xmlns:o="urn:schemas-microsoft-com:office:office" xmlns:dgm="http://schemas.openxmlformats.org/drawingml/2006/diagram" xmlns:c="http://schemas.openxmlformats.org/drawingml/2006/chart" xmlns:mv="urn:schemas-microsoft-com:mac:vml" xmlns:mc="http://schemas.openxmlformats.org/markup-compatibility/2006" xmlns="" val="tx"/>
+                      <ahyp:hlinkClr xmlns="" xmlns:mc="http://schemas.openxmlformats.org/markup-compatibility/2006" xmlns:mv="urn:schemas-microsoft-com:mac:vml" xmlns:c="http://schemas.openxmlformats.org/drawingml/2006/chart" xmlns:dgm="http://schemas.openxmlformats.org/drawingml/2006/diagram" xmlns:o="urn:schemas-microsoft-com:office:office" xmlns:v="urn:schemas-microsoft-com:vml" xmlns:pvml="urn:schemas-microsoft-com:office:powerpoint" xmlns:com="http://schemas.openxmlformats.org/drawingml/2006/compatibility" xmlns:p14="http://schemas.microsoft.com/office/powerpoint/2010/main" xmlns:p15="http://schemas.microsoft.com/office/powerpoint/2012/main" xmlns:ahyp="http://schemas.microsoft.com/office/drawing/2018/hyperlinkcolor" val="tx"/>
                     </a:ext>
                   </a:extLst>
                 </a:hlinkClick>
@@ -14456,7 +14725,7 @@
                 <a:hlinkClick r:id="rId3">
                   <a:extLst>
                     <a:ext uri="{A12FA001-AC4F-418D-AE19-62706E023703}">
-                      <ahyp:hlinkClr xmlns:ahyp="http://schemas.microsoft.com/office/drawing/2018/hyperlinkcolor" xmlns:p15="http://schemas.microsoft.com/office/powerpoint/2012/main" xmlns:p14="http://schemas.microsoft.com/office/powerpoint/2010/main" xmlns:com="http://schemas.openxmlformats.org/drawingml/2006/compatibility" xmlns:pvml="urn:schemas-microsoft-com:office:powerpoint" xmlns:v="urn:schemas-microsoft-com:vml" xmlns:o="urn:schemas-microsoft-com:office:office" xmlns:dgm="http://schemas.openxmlformats.org/drawingml/2006/diagram" xmlns:c="http://schemas.openxmlformats.org/drawingml/2006/chart" xmlns:mv="urn:schemas-microsoft-com:mac:vml" xmlns:mc="http://schemas.openxmlformats.org/markup-compatibility/2006" xmlns="" val="tx"/>
+                      <ahyp:hlinkClr xmlns="" xmlns:mc="http://schemas.openxmlformats.org/markup-compatibility/2006" xmlns:mv="urn:schemas-microsoft-com:mac:vml" xmlns:c="http://schemas.openxmlformats.org/drawingml/2006/chart" xmlns:dgm="http://schemas.openxmlformats.org/drawingml/2006/diagram" xmlns:o="urn:schemas-microsoft-com:office:office" xmlns:v="urn:schemas-microsoft-com:vml" xmlns:pvml="urn:schemas-microsoft-com:office:powerpoint" xmlns:com="http://schemas.openxmlformats.org/drawingml/2006/compatibility" xmlns:p14="http://schemas.microsoft.com/office/powerpoint/2010/main" xmlns:p15="http://schemas.microsoft.com/office/powerpoint/2012/main" xmlns:ahyp="http://schemas.microsoft.com/office/drawing/2018/hyperlinkcolor" val="tx"/>
                     </a:ext>
                   </a:extLst>
                 </a:hlinkClick>
@@ -14796,7 +15065,7 @@
                 <a:hlinkClick r:id="rId4">
                   <a:extLst>
                     <a:ext uri="{A12FA001-AC4F-418D-AE19-62706E023703}">
-                      <ahyp:hlinkClr xmlns:ahyp="http://schemas.microsoft.com/office/drawing/2018/hyperlinkcolor" xmlns:p15="http://schemas.microsoft.com/office/powerpoint/2012/main" xmlns:p14="http://schemas.microsoft.com/office/powerpoint/2010/main" xmlns:com="http://schemas.openxmlformats.org/drawingml/2006/compatibility" xmlns:pvml="urn:schemas-microsoft-com:office:powerpoint" xmlns:v="urn:schemas-microsoft-com:vml" xmlns:o="urn:schemas-microsoft-com:office:office" xmlns:dgm="http://schemas.openxmlformats.org/drawingml/2006/diagram" xmlns:c="http://schemas.openxmlformats.org/drawingml/2006/chart" xmlns:mv="urn:schemas-microsoft-com:mac:vml" xmlns:mc="http://schemas.openxmlformats.org/markup-compatibility/2006" xmlns="" val="tx"/>
+                      <ahyp:hlinkClr xmlns="" xmlns:mc="http://schemas.openxmlformats.org/markup-compatibility/2006" xmlns:mv="urn:schemas-microsoft-com:mac:vml" xmlns:c="http://schemas.openxmlformats.org/drawingml/2006/chart" xmlns:dgm="http://schemas.openxmlformats.org/drawingml/2006/diagram" xmlns:o="urn:schemas-microsoft-com:office:office" xmlns:v="urn:schemas-microsoft-com:vml" xmlns:pvml="urn:schemas-microsoft-com:office:powerpoint" xmlns:com="http://schemas.openxmlformats.org/drawingml/2006/compatibility" xmlns:p14="http://schemas.microsoft.com/office/powerpoint/2010/main" xmlns:p15="http://schemas.microsoft.com/office/powerpoint/2012/main" xmlns:ahyp="http://schemas.microsoft.com/office/drawing/2018/hyperlinkcolor" val="tx"/>
                     </a:ext>
                   </a:extLst>
                 </a:hlinkClick>
@@ -15911,7 +16180,7 @@
                 <a:hlinkClick r:id="rId3">
                   <a:extLst>
                     <a:ext uri="{A12FA001-AC4F-418D-AE19-62706E023703}">
-                      <ahyp:hlinkClr xmlns:ahyp="http://schemas.microsoft.com/office/drawing/2018/hyperlinkcolor" xmlns:p15="http://schemas.microsoft.com/office/powerpoint/2012/main" xmlns:p14="http://schemas.microsoft.com/office/powerpoint/2010/main" xmlns:com="http://schemas.openxmlformats.org/drawingml/2006/compatibility" xmlns:pvml="urn:schemas-microsoft-com:office:powerpoint" xmlns:v="urn:schemas-microsoft-com:vml" xmlns:o="urn:schemas-microsoft-com:office:office" xmlns:dgm="http://schemas.openxmlformats.org/drawingml/2006/diagram" xmlns:c="http://schemas.openxmlformats.org/drawingml/2006/chart" xmlns:mv="urn:schemas-microsoft-com:mac:vml" xmlns:mc="http://schemas.openxmlformats.org/markup-compatibility/2006" xmlns="" val="tx"/>
+                      <ahyp:hlinkClr xmlns="" xmlns:mc="http://schemas.openxmlformats.org/markup-compatibility/2006" xmlns:mv="urn:schemas-microsoft-com:mac:vml" xmlns:c="http://schemas.openxmlformats.org/drawingml/2006/chart" xmlns:dgm="http://schemas.openxmlformats.org/drawingml/2006/diagram" xmlns:o="urn:schemas-microsoft-com:office:office" xmlns:v="urn:schemas-microsoft-com:vml" xmlns:pvml="urn:schemas-microsoft-com:office:powerpoint" xmlns:com="http://schemas.openxmlformats.org/drawingml/2006/compatibility" xmlns:p14="http://schemas.microsoft.com/office/powerpoint/2010/main" xmlns:p15="http://schemas.microsoft.com/office/powerpoint/2012/main" xmlns:ahyp="http://schemas.microsoft.com/office/drawing/2018/hyperlinkcolor" val="tx"/>
                     </a:ext>
                   </a:extLst>
                 </a:hlinkClick>
@@ -17030,7 +17299,7 @@
                 <a:hlinkClick r:id="rId3">
                   <a:extLst>
                     <a:ext uri="{A12FA001-AC4F-418D-AE19-62706E023703}">
-                      <ahyp:hlinkClr xmlns:ahyp="http://schemas.microsoft.com/office/drawing/2018/hyperlinkcolor" xmlns:p15="http://schemas.microsoft.com/office/powerpoint/2012/main" xmlns:p14="http://schemas.microsoft.com/office/powerpoint/2010/main" xmlns:com="http://schemas.openxmlformats.org/drawingml/2006/compatibility" xmlns:pvml="urn:schemas-microsoft-com:office:powerpoint" xmlns:v="urn:schemas-microsoft-com:vml" xmlns:o="urn:schemas-microsoft-com:office:office" xmlns:dgm="http://schemas.openxmlformats.org/drawingml/2006/diagram" xmlns:c="http://schemas.openxmlformats.org/drawingml/2006/chart" xmlns:mv="urn:schemas-microsoft-com:mac:vml" xmlns:mc="http://schemas.openxmlformats.org/markup-compatibility/2006" xmlns="" val="tx"/>
+                      <ahyp:hlinkClr xmlns="" xmlns:mc="http://schemas.openxmlformats.org/markup-compatibility/2006" xmlns:mv="urn:schemas-microsoft-com:mac:vml" xmlns:c="http://schemas.openxmlformats.org/drawingml/2006/chart" xmlns:dgm="http://schemas.openxmlformats.org/drawingml/2006/diagram" xmlns:o="urn:schemas-microsoft-com:office:office" xmlns:v="urn:schemas-microsoft-com:vml" xmlns:pvml="urn:schemas-microsoft-com:office:powerpoint" xmlns:com="http://schemas.openxmlformats.org/drawingml/2006/compatibility" xmlns:p14="http://schemas.microsoft.com/office/powerpoint/2010/main" xmlns:p15="http://schemas.microsoft.com/office/powerpoint/2012/main" xmlns:ahyp="http://schemas.microsoft.com/office/drawing/2018/hyperlinkcolor" val="tx"/>
                     </a:ext>
                   </a:extLst>
                 </a:hlinkClick>
@@ -17623,7 +17892,7 @@
               <a:buNone/>
             </a:pPr>
             <a:r>
-              <a:rPr lang="pt-BR" sz="3000" dirty="0">
+              <a:rPr lang="pt-BR" sz="3000" dirty="0" smtClean="0">
                 <a:solidFill>
                   <a:srgbClr val="BF9000"/>
                 </a:solidFill>
@@ -17632,7 +17901,7 @@
                 <a:cs typeface="Comic Sans MS"/>
                 <a:sym typeface="Comic Sans MS"/>
               </a:rPr>
-              <a:t>Plano de Ação para documentação </a:t>
+              <a:t>Etapas para adesão, documentação </a:t>
             </a:r>
             <a:endParaRPr sz="3000" dirty="0">
               <a:solidFill>
@@ -17730,6 +17999,791 @@
   <p:cSld>
     <p:spTree>
       <p:nvGrpSpPr>
+        <p:cNvPr id="1" name="Shape 242"/>
+        <p:cNvGrpSpPr/>
+        <p:nvPr/>
+      </p:nvGrpSpPr>
+      <p:grpSpPr>
+        <a:xfrm>
+          <a:off x="0" y="0"/>
+          <a:ext cx="0" cy="0"/>
+          <a:chOff x="0" y="0"/>
+          <a:chExt cx="0" cy="0"/>
+        </a:xfrm>
+      </p:grpSpPr>
+      <p:sp>
+        <p:nvSpPr>
+          <p:cNvPr id="243" name="Google Shape;243;gede490e3ad_0_3905"/>
+          <p:cNvSpPr txBox="1">
+            <a:spLocks noGrp="1"/>
+          </p:cNvSpPr>
+          <p:nvPr>
+            <p:ph type="title"/>
+          </p:nvPr>
+        </p:nvSpPr>
+        <p:spPr>
+          <a:xfrm>
+            <a:off x="4496696" y="-8"/>
+            <a:ext cx="7562700" cy="548700"/>
+          </a:xfrm>
+          <a:prstGeom prst="rect">
+            <a:avLst/>
+          </a:prstGeom>
+          <a:noFill/>
+          <a:ln>
+            <a:noFill/>
+          </a:ln>
+        </p:spPr>
+        <p:txBody>
+          <a:bodyPr spcFirstLastPara="1" wrap="square" lIns="91425" tIns="45700" rIns="91425" bIns="45700" anchor="b" anchorCtr="0">
+            <a:noAutofit/>
+          </a:bodyPr>
+          <a:lstStyle/>
+          <a:p>
+            <a:pPr marL="0" lvl="0" indent="0" algn="r" rtl="0">
+              <a:lnSpc>
+                <a:spcPct val="90000"/>
+              </a:lnSpc>
+              <a:spcBef>
+                <a:spcPts val="0"/>
+              </a:spcBef>
+              <a:spcAft>
+                <a:spcPts val="0"/>
+              </a:spcAft>
+              <a:buClr>
+                <a:schemeClr val="lt1"/>
+              </a:buClr>
+              <a:buSzPts val="2400"/>
+              <a:buFont typeface="Arial Narrow"/>
+              <a:buNone/>
+            </a:pPr>
+            <a:r>
+              <a:rPr lang="pt-BR" sz="2800" dirty="0" smtClean="0">
+                <a:solidFill>
+                  <a:schemeClr val="lt1"/>
+                </a:solidFill>
+                <a:latin typeface="Comic Sans MS"/>
+                <a:ea typeface="Comic Sans MS"/>
+                <a:cs typeface="Comic Sans MS"/>
+                <a:sym typeface="Comic Sans MS"/>
+              </a:rPr>
+              <a:t>Próximos passos</a:t>
+            </a:r>
+            <a:endParaRPr dirty="0">
+              <a:solidFill>
+                <a:schemeClr val="lt1"/>
+              </a:solidFill>
+              <a:latin typeface="Comic Sans MS"/>
+              <a:ea typeface="Comic Sans MS"/>
+              <a:cs typeface="Comic Sans MS"/>
+              <a:sym typeface="Comic Sans MS"/>
+            </a:endParaRPr>
+          </a:p>
+        </p:txBody>
+      </p:sp>
+      <p:sp>
+        <p:nvSpPr>
+          <p:cNvPr id="245" name="Google Shape;245;gede490e3ad_0_3905"/>
+          <p:cNvSpPr/>
+          <p:nvPr/>
+        </p:nvSpPr>
+        <p:spPr>
+          <a:xfrm>
+            <a:off x="9357325" y="1165225"/>
+            <a:ext cx="2834700" cy="57000"/>
+          </a:xfrm>
+          <a:prstGeom prst="rect">
+            <a:avLst/>
+          </a:prstGeom>
+          <a:solidFill>
+            <a:srgbClr val="F1C232"/>
+          </a:solidFill>
+          <a:ln w="9525" cap="flat" cmpd="sng">
+            <a:solidFill>
+              <a:schemeClr val="lt1"/>
+            </a:solidFill>
+            <a:prstDash val="solid"/>
+            <a:round/>
+            <a:headEnd type="none" w="sm" len="sm"/>
+            <a:tailEnd type="none" w="sm" len="sm"/>
+          </a:ln>
+        </p:spPr>
+        <p:txBody>
+          <a:bodyPr spcFirstLastPara="1" wrap="square" lIns="91425" tIns="91425" rIns="91425" bIns="91425" anchor="ctr" anchorCtr="0">
+            <a:noAutofit/>
+          </a:bodyPr>
+          <a:lstStyle/>
+          <a:p>
+            <a:pPr marL="0" lvl="0" indent="0" algn="l" rtl="0">
+              <a:spcBef>
+                <a:spcPts val="0"/>
+              </a:spcBef>
+              <a:spcAft>
+                <a:spcPts val="0"/>
+              </a:spcAft>
+              <a:buNone/>
+            </a:pPr>
+            <a:endParaRPr/>
+          </a:p>
+        </p:txBody>
+      </p:sp>
+      <p:sp>
+        <p:nvSpPr>
+          <p:cNvPr id="246" name="Google Shape;246;gede490e3ad_0_3905"/>
+          <p:cNvSpPr/>
+          <p:nvPr/>
+        </p:nvSpPr>
+        <p:spPr>
+          <a:xfrm>
+            <a:off x="2335325" y="1553875"/>
+            <a:ext cx="3816900" cy="1359600"/>
+          </a:xfrm>
+          <a:prstGeom prst="chevron">
+            <a:avLst>
+              <a:gd name="adj" fmla="val 50000"/>
+            </a:avLst>
+          </a:prstGeom>
+          <a:solidFill>
+            <a:srgbClr val="CC4125"/>
+          </a:solidFill>
+          <a:ln w="9525" cap="flat" cmpd="sng">
+            <a:solidFill>
+              <a:schemeClr val="lt1"/>
+            </a:solidFill>
+            <a:prstDash val="solid"/>
+            <a:round/>
+            <a:headEnd type="none" w="sm" len="sm"/>
+            <a:tailEnd type="none" w="sm" len="sm"/>
+          </a:ln>
+        </p:spPr>
+        <p:txBody>
+          <a:bodyPr spcFirstLastPara="1" wrap="square" lIns="91425" tIns="91425" rIns="91425" bIns="91425" anchor="ctr" anchorCtr="0">
+            <a:noAutofit/>
+          </a:bodyPr>
+          <a:lstStyle/>
+          <a:p>
+            <a:pPr marL="0" lvl="0" indent="0" algn="l" rtl="0">
+              <a:spcBef>
+                <a:spcPts val="0"/>
+              </a:spcBef>
+              <a:spcAft>
+                <a:spcPts val="0"/>
+              </a:spcAft>
+              <a:buNone/>
+            </a:pPr>
+            <a:r>
+              <a:rPr lang="pt-BR" sz="2000">
+                <a:solidFill>
+                  <a:schemeClr val="lt1"/>
+                </a:solidFill>
+                <a:latin typeface="Arial Narrow"/>
+                <a:ea typeface="Arial Narrow"/>
+                <a:cs typeface="Arial Narrow"/>
+                <a:sym typeface="Arial Narrow"/>
+              </a:rPr>
+              <a:t>         </a:t>
+            </a:r>
+            <a:endParaRPr sz="2000">
+              <a:solidFill>
+                <a:schemeClr val="lt1"/>
+              </a:solidFill>
+            </a:endParaRPr>
+          </a:p>
+        </p:txBody>
+      </p:sp>
+      <p:sp>
+        <p:nvSpPr>
+          <p:cNvPr id="247" name="Google Shape;247;gede490e3ad_0_3905"/>
+          <p:cNvSpPr/>
+          <p:nvPr/>
+        </p:nvSpPr>
+        <p:spPr>
+          <a:xfrm>
+            <a:off x="5390225" y="1222225"/>
+            <a:ext cx="3995100" cy="1815300"/>
+          </a:xfrm>
+          <a:prstGeom prst="chevron">
+            <a:avLst>
+              <a:gd name="adj" fmla="val 50000"/>
+            </a:avLst>
+          </a:prstGeom>
+          <a:solidFill>
+            <a:srgbClr val="E06666"/>
+          </a:solidFill>
+          <a:ln w="9525" cap="flat" cmpd="sng">
+            <a:solidFill>
+              <a:schemeClr val="lt1"/>
+            </a:solidFill>
+            <a:prstDash val="solid"/>
+            <a:round/>
+            <a:headEnd type="none" w="sm" len="sm"/>
+            <a:tailEnd type="none" w="sm" len="sm"/>
+          </a:ln>
+        </p:spPr>
+        <p:txBody>
+          <a:bodyPr spcFirstLastPara="1" wrap="square" lIns="91425" tIns="91425" rIns="91425" bIns="91425" anchor="ctr" anchorCtr="0">
+            <a:noAutofit/>
+          </a:bodyPr>
+          <a:lstStyle/>
+          <a:p>
+            <a:pPr marL="0" lvl="0" indent="0" algn="l" rtl="0">
+              <a:spcBef>
+                <a:spcPts val="0"/>
+              </a:spcBef>
+              <a:spcAft>
+                <a:spcPts val="0"/>
+              </a:spcAft>
+              <a:buNone/>
+            </a:pPr>
+            <a:r>
+              <a:rPr lang="pt-BR" sz="1900" dirty="0" smtClean="0">
+                <a:solidFill>
+                  <a:schemeClr val="lt1"/>
+                </a:solidFill>
+              </a:rPr>
+              <a:t>Testes em homologação e   solicitação de criação de usuário em produção</a:t>
+            </a:r>
+            <a:endParaRPr sz="1900" dirty="0">
+              <a:solidFill>
+                <a:schemeClr val="lt1"/>
+              </a:solidFill>
+            </a:endParaRPr>
+          </a:p>
+        </p:txBody>
+      </p:sp>
+      <p:sp>
+        <p:nvSpPr>
+          <p:cNvPr id="249" name="Google Shape;249;gede490e3ad_0_3905"/>
+          <p:cNvSpPr/>
+          <p:nvPr/>
+        </p:nvSpPr>
+        <p:spPr>
+          <a:xfrm>
+            <a:off x="2555125" y="1222225"/>
+            <a:ext cx="3890100" cy="1815300"/>
+          </a:xfrm>
+          <a:prstGeom prst="chevron">
+            <a:avLst>
+              <a:gd name="adj" fmla="val 50000"/>
+            </a:avLst>
+          </a:prstGeom>
+          <a:solidFill>
+            <a:srgbClr val="CC4125"/>
+          </a:solidFill>
+          <a:ln w="9525" cap="flat" cmpd="sng">
+            <a:solidFill>
+              <a:schemeClr val="lt1"/>
+            </a:solidFill>
+            <a:prstDash val="solid"/>
+            <a:round/>
+            <a:headEnd type="none" w="sm" len="sm"/>
+            <a:tailEnd type="none" w="sm" len="sm"/>
+          </a:ln>
+        </p:spPr>
+        <p:txBody>
+          <a:bodyPr spcFirstLastPara="1" wrap="square" lIns="91425" tIns="91425" rIns="91425" bIns="91425" anchor="ctr" anchorCtr="0">
+            <a:noAutofit/>
+          </a:bodyPr>
+          <a:lstStyle/>
+          <a:p>
+            <a:pPr marL="0" lvl="0" indent="0" algn="l" rtl="0">
+              <a:spcBef>
+                <a:spcPts val="0"/>
+              </a:spcBef>
+              <a:spcAft>
+                <a:spcPts val="0"/>
+              </a:spcAft>
+              <a:buNone/>
+            </a:pPr>
+            <a:r>
+              <a:rPr lang="pt-BR" sz="2000">
+                <a:solidFill>
+                  <a:schemeClr val="lt1"/>
+                </a:solidFill>
+                <a:latin typeface="Arial Narrow"/>
+                <a:ea typeface="Arial Narrow"/>
+                <a:cs typeface="Arial Narrow"/>
+                <a:sym typeface="Arial Narrow"/>
+              </a:rPr>
+              <a:t>        </a:t>
+            </a:r>
+            <a:endParaRPr sz="2000">
+              <a:solidFill>
+                <a:schemeClr val="lt1"/>
+              </a:solidFill>
+            </a:endParaRPr>
+          </a:p>
+        </p:txBody>
+      </p:sp>
+      <p:sp>
+        <p:nvSpPr>
+          <p:cNvPr id="250" name="Google Shape;250;gede490e3ad_0_3905"/>
+          <p:cNvSpPr/>
+          <p:nvPr/>
+        </p:nvSpPr>
+        <p:spPr>
+          <a:xfrm>
+            <a:off x="0" y="1222225"/>
+            <a:ext cx="3462300" cy="1815300"/>
+          </a:xfrm>
+          <a:prstGeom prst="homePlate">
+            <a:avLst>
+              <a:gd name="adj" fmla="val 50000"/>
+            </a:avLst>
+          </a:prstGeom>
+          <a:solidFill>
+            <a:srgbClr val="A61C00"/>
+          </a:solidFill>
+          <a:ln w="9525" cap="flat" cmpd="sng">
+            <a:solidFill>
+              <a:schemeClr val="lt1"/>
+            </a:solidFill>
+            <a:prstDash val="solid"/>
+            <a:round/>
+            <a:headEnd type="none" w="sm" len="sm"/>
+            <a:tailEnd type="none" w="sm" len="sm"/>
+          </a:ln>
+        </p:spPr>
+        <p:txBody>
+          <a:bodyPr spcFirstLastPara="1" wrap="square" lIns="91425" tIns="91425" rIns="91425" bIns="91425" anchor="ctr" anchorCtr="0">
+            <a:noAutofit/>
+          </a:bodyPr>
+          <a:lstStyle/>
+          <a:p>
+            <a:pPr marL="0" lvl="0" indent="0" algn="l" rtl="0">
+              <a:spcBef>
+                <a:spcPts val="0"/>
+              </a:spcBef>
+              <a:spcAft>
+                <a:spcPts val="0"/>
+              </a:spcAft>
+              <a:buNone/>
+            </a:pPr>
+            <a:r>
+              <a:rPr lang="pt-BR" sz="2000" dirty="0" smtClean="0">
+                <a:solidFill>
+                  <a:schemeClr val="lt1"/>
+                </a:solidFill>
+                <a:latin typeface="Arial Narrow"/>
+                <a:sym typeface="Arial Narrow"/>
+              </a:rPr>
+              <a:t>Escolha das bases prioritárias e transformação para bases tabulares abertas</a:t>
+            </a:r>
+            <a:endParaRPr sz="2000" dirty="0">
+              <a:solidFill>
+                <a:schemeClr val="lt1"/>
+              </a:solidFill>
+            </a:endParaRPr>
+          </a:p>
+        </p:txBody>
+      </p:sp>
+      <p:sp>
+        <p:nvSpPr>
+          <p:cNvPr id="251" name="Google Shape;251;gede490e3ad_0_3905"/>
+          <p:cNvSpPr txBox="1"/>
+          <p:nvPr/>
+        </p:nvSpPr>
+        <p:spPr>
+          <a:xfrm>
+            <a:off x="3002016" y="1541403"/>
+            <a:ext cx="3395700" cy="1107965"/>
+          </a:xfrm>
+          <a:prstGeom prst="rect">
+            <a:avLst/>
+          </a:prstGeom>
+          <a:noFill/>
+          <a:ln>
+            <a:noFill/>
+          </a:ln>
+        </p:spPr>
+        <p:txBody>
+          <a:bodyPr spcFirstLastPara="1" wrap="square" lIns="91425" tIns="91425" rIns="91425" bIns="91425" anchor="t" anchorCtr="0">
+            <a:spAutoFit/>
+          </a:bodyPr>
+          <a:lstStyle/>
+          <a:p>
+            <a:pPr marL="457200" lvl="0" indent="0" algn="l" rtl="0">
+              <a:spcBef>
+                <a:spcPts val="0"/>
+              </a:spcBef>
+              <a:spcAft>
+                <a:spcPts val="0"/>
+              </a:spcAft>
+              <a:buNone/>
+            </a:pPr>
+            <a:r>
+              <a:rPr lang="pt-BR" sz="2000" dirty="0" smtClean="0">
+                <a:solidFill>
+                  <a:schemeClr val="lt1"/>
+                </a:solidFill>
+              </a:rPr>
+              <a:t>Setup das máquinas para validação dos dicionários de dados</a:t>
+            </a:r>
+            <a:endParaRPr sz="2000" dirty="0">
+              <a:solidFill>
+                <a:schemeClr val="lt1"/>
+              </a:solidFill>
+            </a:endParaRPr>
+          </a:p>
+        </p:txBody>
+      </p:sp>
+      <p:sp>
+        <p:nvSpPr>
+          <p:cNvPr id="253" name="Google Shape;253;gede490e3ad_0_3905"/>
+          <p:cNvSpPr/>
+          <p:nvPr/>
+        </p:nvSpPr>
+        <p:spPr>
+          <a:xfrm>
+            <a:off x="7675440" y="2913475"/>
+            <a:ext cx="4559770" cy="3123229"/>
+          </a:xfrm>
+          <a:prstGeom prst="chevron">
+            <a:avLst>
+              <a:gd name="adj" fmla="val 50000"/>
+            </a:avLst>
+          </a:prstGeom>
+          <a:solidFill>
+            <a:srgbClr val="F4CCCC"/>
+          </a:solidFill>
+          <a:ln w="9525" cap="flat" cmpd="sng">
+            <a:solidFill>
+              <a:schemeClr val="lt1"/>
+            </a:solidFill>
+            <a:prstDash val="solid"/>
+            <a:round/>
+            <a:headEnd type="none" w="sm" len="sm"/>
+            <a:tailEnd type="none" w="sm" len="sm"/>
+          </a:ln>
+        </p:spPr>
+        <p:txBody>
+          <a:bodyPr spcFirstLastPara="1" wrap="square" lIns="91425" tIns="91425" rIns="91425" bIns="91425" anchor="ctr" anchorCtr="0">
+            <a:noAutofit/>
+          </a:bodyPr>
+          <a:lstStyle/>
+          <a:p>
+            <a:pPr marL="0" lvl="0" indent="0" algn="l" rtl="0">
+              <a:spcBef>
+                <a:spcPts val="0"/>
+              </a:spcBef>
+              <a:spcAft>
+                <a:spcPts val="0"/>
+              </a:spcAft>
+              <a:buNone/>
+            </a:pPr>
+            <a:r>
+              <a:rPr lang="pt-BR" sz="1900" dirty="0" smtClean="0">
+                <a:solidFill>
+                  <a:srgbClr val="002060"/>
+                </a:solidFill>
+              </a:rPr>
+              <a:t>Reunião de publicação da base de dados inicial e assinatura de adesão ao </a:t>
+            </a:r>
+            <a:r>
+              <a:rPr lang="pt-BR" sz="1900" dirty="0" err="1" smtClean="0">
+                <a:solidFill>
+                  <a:srgbClr val="002060"/>
+                </a:solidFill>
+              </a:rPr>
+              <a:t>PdA</a:t>
+            </a:r>
+            <a:endParaRPr sz="1900" dirty="0">
+              <a:solidFill>
+                <a:srgbClr val="002060"/>
+              </a:solidFill>
+            </a:endParaRPr>
+          </a:p>
+        </p:txBody>
+      </p:sp>
+      <p:sp>
+        <p:nvSpPr>
+          <p:cNvPr id="14" name="Google Shape;316;gede490e3ad_0_3947"/>
+          <p:cNvSpPr/>
+          <p:nvPr/>
+        </p:nvSpPr>
+        <p:spPr>
+          <a:xfrm>
+            <a:off x="0" y="3064410"/>
+            <a:ext cx="7620000" cy="891978"/>
+          </a:xfrm>
+          <a:prstGeom prst="homePlate">
+            <a:avLst>
+              <a:gd name="adj" fmla="val 50000"/>
+            </a:avLst>
+          </a:prstGeom>
+          <a:solidFill>
+            <a:srgbClr val="BF9000"/>
+          </a:solidFill>
+          <a:ln>
+            <a:noFill/>
+          </a:ln>
+        </p:spPr>
+        <p:txBody>
+          <a:bodyPr spcFirstLastPara="1" wrap="square" lIns="121900" tIns="121900" rIns="121900" bIns="121900" anchor="ctr" anchorCtr="0">
+            <a:noAutofit/>
+          </a:bodyPr>
+          <a:lstStyle/>
+          <a:p>
+            <a:pPr marL="0" lvl="0" indent="0" algn="ctr" rtl="0">
+              <a:lnSpc>
+                <a:spcPct val="90000"/>
+              </a:lnSpc>
+              <a:spcBef>
+                <a:spcPts val="700"/>
+              </a:spcBef>
+              <a:spcAft>
+                <a:spcPts val="0"/>
+              </a:spcAft>
+              <a:buClr>
+                <a:schemeClr val="dk1"/>
+              </a:buClr>
+              <a:buFont typeface="Arial"/>
+              <a:buNone/>
+            </a:pPr>
+            <a:r>
+              <a:rPr lang="pt-BR" sz="2200" b="1" dirty="0">
+                <a:solidFill>
+                  <a:schemeClr val="dk1"/>
+                </a:solidFill>
+                <a:latin typeface="Arial Narrow"/>
+                <a:ea typeface="Arial Narrow"/>
+                <a:cs typeface="Arial Narrow"/>
+                <a:sym typeface="Arial Narrow"/>
+              </a:rPr>
+              <a:t>Dicionário de dados</a:t>
+            </a:r>
+            <a:endParaRPr sz="2100" b="1" dirty="0">
+              <a:solidFill>
+                <a:schemeClr val="dk1"/>
+              </a:solidFill>
+              <a:latin typeface="Roboto"/>
+              <a:ea typeface="Roboto"/>
+              <a:cs typeface="Roboto"/>
+              <a:sym typeface="Roboto"/>
+            </a:endParaRPr>
+          </a:p>
+        </p:txBody>
+      </p:sp>
+      <p:sp>
+        <p:nvSpPr>
+          <p:cNvPr id="20" name="Google Shape;362;gede490e3ad_0_4170"/>
+          <p:cNvSpPr/>
+          <p:nvPr/>
+        </p:nvSpPr>
+        <p:spPr>
+          <a:xfrm>
+            <a:off x="24461" y="5740344"/>
+            <a:ext cx="7595539" cy="891978"/>
+          </a:xfrm>
+          <a:prstGeom prst="chevron">
+            <a:avLst>
+              <a:gd name="adj" fmla="val 50000"/>
+            </a:avLst>
+          </a:prstGeom>
+          <a:solidFill>
+            <a:srgbClr val="FFD966"/>
+          </a:solidFill>
+          <a:ln>
+            <a:noFill/>
+          </a:ln>
+        </p:spPr>
+        <p:txBody>
+          <a:bodyPr spcFirstLastPara="1" wrap="square" lIns="121900" tIns="121900" rIns="121900" bIns="121900" anchor="ctr" anchorCtr="0">
+            <a:noAutofit/>
+          </a:bodyPr>
+          <a:lstStyle/>
+          <a:p>
+            <a:pPr marL="0" lvl="0" indent="0" algn="ctr" rtl="0">
+              <a:lnSpc>
+                <a:spcPct val="90000"/>
+              </a:lnSpc>
+              <a:spcBef>
+                <a:spcPts val="0"/>
+              </a:spcBef>
+              <a:spcAft>
+                <a:spcPts val="0"/>
+              </a:spcAft>
+              <a:buNone/>
+            </a:pPr>
+            <a:r>
+              <a:rPr lang="pt-BR" sz="2200" b="1">
+                <a:solidFill>
+                  <a:schemeClr val="dk1"/>
+                </a:solidFill>
+                <a:latin typeface="Arial Narrow"/>
+                <a:ea typeface="Arial Narrow"/>
+                <a:cs typeface="Arial Narrow"/>
+                <a:sym typeface="Arial Narrow"/>
+              </a:rPr>
+              <a:t>Catalogação</a:t>
+            </a:r>
+            <a:endParaRPr sz="2200" b="1">
+              <a:solidFill>
+                <a:schemeClr val="dk1"/>
+              </a:solidFill>
+              <a:latin typeface="Arial Narrow"/>
+              <a:ea typeface="Arial Narrow"/>
+              <a:cs typeface="Arial Narrow"/>
+              <a:sym typeface="Arial Narrow"/>
+            </a:endParaRPr>
+          </a:p>
+        </p:txBody>
+      </p:sp>
+      <p:sp>
+        <p:nvSpPr>
+          <p:cNvPr id="23" name="Google Shape;365;gede490e3ad_0_4170"/>
+          <p:cNvSpPr/>
+          <p:nvPr/>
+        </p:nvSpPr>
+        <p:spPr>
+          <a:xfrm>
+            <a:off x="0" y="3956388"/>
+            <a:ext cx="7620000" cy="891978"/>
+          </a:xfrm>
+          <a:prstGeom prst="homePlate">
+            <a:avLst>
+              <a:gd name="adj" fmla="val 50000"/>
+            </a:avLst>
+          </a:prstGeom>
+          <a:solidFill>
+            <a:srgbClr val="BF9000"/>
+          </a:solidFill>
+          <a:ln>
+            <a:noFill/>
+          </a:ln>
+        </p:spPr>
+        <p:txBody>
+          <a:bodyPr spcFirstLastPara="1" wrap="square" lIns="121900" tIns="121900" rIns="121900" bIns="121900" anchor="ctr" anchorCtr="0">
+            <a:noAutofit/>
+          </a:bodyPr>
+          <a:lstStyle/>
+          <a:p>
+            <a:pPr marL="0" lvl="0" indent="0" algn="ctr" rtl="0">
+              <a:lnSpc>
+                <a:spcPct val="90000"/>
+              </a:lnSpc>
+              <a:spcBef>
+                <a:spcPts val="385"/>
+              </a:spcBef>
+              <a:spcAft>
+                <a:spcPts val="0"/>
+              </a:spcAft>
+              <a:buNone/>
+            </a:pPr>
+            <a:r>
+              <a:rPr lang="pt-BR" sz="2200" b="1" dirty="0">
+                <a:solidFill>
+                  <a:schemeClr val="dk1"/>
+                </a:solidFill>
+                <a:latin typeface="Arial Narrow"/>
+                <a:ea typeface="Arial Narrow"/>
+                <a:cs typeface="Arial Narrow"/>
+                <a:sym typeface="Arial Narrow"/>
+              </a:rPr>
+              <a:t>Validação dos dados</a:t>
+            </a:r>
+            <a:endParaRPr sz="2200" b="1" dirty="0">
+              <a:solidFill>
+                <a:schemeClr val="dk1"/>
+              </a:solidFill>
+              <a:latin typeface="Arial Narrow"/>
+              <a:ea typeface="Arial Narrow"/>
+              <a:cs typeface="Arial Narrow"/>
+              <a:sym typeface="Arial Narrow"/>
+            </a:endParaRPr>
+          </a:p>
+        </p:txBody>
+      </p:sp>
+      <p:sp>
+        <p:nvSpPr>
+          <p:cNvPr id="26" name="Google Shape;368;gede490e3ad_0_4170"/>
+          <p:cNvSpPr/>
+          <p:nvPr/>
+        </p:nvSpPr>
+        <p:spPr>
+          <a:xfrm>
+            <a:off x="12230" y="4848366"/>
+            <a:ext cx="7607770" cy="891978"/>
+          </a:xfrm>
+          <a:prstGeom prst="chevron">
+            <a:avLst>
+              <a:gd name="adj" fmla="val 50000"/>
+            </a:avLst>
+          </a:prstGeom>
+          <a:solidFill>
+            <a:srgbClr val="F1C232"/>
+          </a:solidFill>
+          <a:ln>
+            <a:noFill/>
+          </a:ln>
+        </p:spPr>
+        <p:txBody>
+          <a:bodyPr spcFirstLastPara="1" wrap="square" lIns="121900" tIns="121900" rIns="121900" bIns="121900" anchor="ctr" anchorCtr="0">
+            <a:noAutofit/>
+          </a:bodyPr>
+          <a:lstStyle/>
+          <a:p>
+            <a:pPr marL="0" lvl="0" indent="0" algn="ctr" rtl="0">
+              <a:lnSpc>
+                <a:spcPct val="90000"/>
+              </a:lnSpc>
+              <a:spcBef>
+                <a:spcPts val="0"/>
+              </a:spcBef>
+              <a:spcAft>
+                <a:spcPts val="0"/>
+              </a:spcAft>
+              <a:buNone/>
+            </a:pPr>
+            <a:r>
+              <a:rPr lang="pt-BR" sz="2200" b="1">
+                <a:solidFill>
+                  <a:schemeClr val="dk1"/>
+                </a:solidFill>
+                <a:latin typeface="Arial Narrow"/>
+                <a:ea typeface="Arial Narrow"/>
+                <a:cs typeface="Arial Narrow"/>
+                <a:sym typeface="Arial Narrow"/>
+              </a:rPr>
+              <a:t>Controle de versão</a:t>
+            </a:r>
+            <a:endParaRPr sz="2200" b="1">
+              <a:solidFill>
+                <a:schemeClr val="dk1"/>
+              </a:solidFill>
+              <a:latin typeface="Arial Narrow"/>
+              <a:ea typeface="Arial Narrow"/>
+              <a:cs typeface="Arial Narrow"/>
+              <a:sym typeface="Arial Narrow"/>
+            </a:endParaRPr>
+          </a:p>
+        </p:txBody>
+      </p:sp>
+    </p:spTree>
+    <p:extLst>
+      <p:ext uri="{BB962C8B-B14F-4D97-AF65-F5344CB8AC3E}">
+        <p14:creationId xmlns:p14="http://schemas.microsoft.com/office/powerpoint/2010/main" val="3634691398"/>
+      </p:ext>
+    </p:extLst>
+  </p:cSld>
+  <p:clrMapOvr>
+    <a:masterClrMapping/>
+  </p:clrMapOvr>
+  <p:timing>
+    <p:tnLst>
+      <p:par>
+        <p:cTn id="1" dur="indefinite" restart="never" nodeType="tmRoot"/>
+      </p:par>
+    </p:tnLst>
+  </p:timing>
+</p:sld>
+</file>
+
+<file path=ppt/slides/slide17.xml><?xml version="1.0" encoding="utf-8"?>
+<p:sld xmlns:a="http://schemas.openxmlformats.org/drawingml/2006/main" xmlns:r="http://schemas.openxmlformats.org/officeDocument/2006/relationships" xmlns:p="http://schemas.openxmlformats.org/presentationml/2006/main">
+  <p:cSld>
+    <p:spTree>
+      <p:nvGrpSpPr>
         <p:cNvPr id="1" name="Shape 274"/>
         <p:cNvGrpSpPr/>
         <p:nvPr/>
@@ -17789,7 +18843,7 @@
               <a:buNone/>
             </a:pPr>
             <a:r>
-              <a:rPr lang="pt-BR" sz="3300">
+              <a:rPr lang="pt-BR" sz="3300" dirty="0" smtClean="0">
                 <a:solidFill>
                   <a:schemeClr val="lt1"/>
                 </a:solidFill>
@@ -17798,17 +18852,9 @@
                 <a:cs typeface="Comic Sans MS"/>
                 <a:sym typeface="Comic Sans MS"/>
               </a:rPr>
-              <a:t>Próximas etapas</a:t>
-            </a:r>
-            <a:r>
-              <a:rPr lang="pt-BR" sz="3300">
-                <a:solidFill>
-                  <a:schemeClr val="lt1"/>
-                </a:solidFill>
-              </a:rPr>
-              <a:t> </a:t>
-            </a:r>
-            <a:endParaRPr sz="3300">
+              <a:t>Etapas técnicas</a:t>
+            </a:r>
+            <a:endParaRPr sz="3300" dirty="0">
               <a:latin typeface="Comic Sans MS"/>
               <a:ea typeface="Comic Sans MS"/>
               <a:cs typeface="Comic Sans MS"/>
@@ -19118,7 +20164,7 @@
 </p:sld>
 </file>
 
-<file path=ppt/slides/slide17.xml><?xml version="1.0" encoding="utf-8"?>
+<file path=ppt/slides/slide18.xml><?xml version="1.0" encoding="utf-8"?>
 <p:sld xmlns:a="http://schemas.openxmlformats.org/drawingml/2006/main" xmlns:r="http://schemas.openxmlformats.org/officeDocument/2006/relationships" xmlns:p="http://schemas.openxmlformats.org/presentationml/2006/main" show="0">
   <p:cSld>
     <p:spTree>
@@ -19605,7 +20651,7 @@
                 <a:buNone/>
               </a:pPr>
               <a:r>
-                <a:rPr lang="pt-BR" sz="2200" b="1">
+                <a:rPr lang="pt-BR" sz="2200" b="1" dirty="0">
                   <a:solidFill>
                     <a:schemeClr val="dk1"/>
                   </a:solidFill>
@@ -19616,7 +20662,7 @@
                 </a:rPr>
                 <a:t>Dicionário de dados</a:t>
               </a:r>
-              <a:endParaRPr sz="2100" b="1">
+              <a:endParaRPr sz="2100" b="1" dirty="0">
                 <a:solidFill>
                   <a:schemeClr val="dk1"/>
                 </a:solidFill>
@@ -19685,7 +20731,7 @@
                   <a:hlinkClick r:id="rId3">
                     <a:extLst>
                       <a:ext uri="{A12FA001-AC4F-418D-AE19-62706E023703}">
-                        <ahyp:hlinkClr xmlns:ahyp="http://schemas.microsoft.com/office/drawing/2018/hyperlinkcolor" xmlns:p15="http://schemas.microsoft.com/office/powerpoint/2012/main" xmlns:p14="http://schemas.microsoft.com/office/powerpoint/2010/main" xmlns:com="http://schemas.openxmlformats.org/drawingml/2006/compatibility" xmlns:pvml="urn:schemas-microsoft-com:office:powerpoint" xmlns:v="urn:schemas-microsoft-com:vml" xmlns:o="urn:schemas-microsoft-com:office:office" xmlns:dgm="http://schemas.openxmlformats.org/drawingml/2006/diagram" xmlns:c="http://schemas.openxmlformats.org/drawingml/2006/chart" xmlns:mv="urn:schemas-microsoft-com:mac:vml" xmlns:mc="http://schemas.openxmlformats.org/markup-compatibility/2006" xmlns="" val="tx"/>
+                        <ahyp:hlinkClr xmlns="" xmlns:mc="http://schemas.openxmlformats.org/markup-compatibility/2006" xmlns:mv="urn:schemas-microsoft-com:mac:vml" xmlns:c="http://schemas.openxmlformats.org/drawingml/2006/chart" xmlns:dgm="http://schemas.openxmlformats.org/drawingml/2006/diagram" xmlns:o="urn:schemas-microsoft-com:office:office" xmlns:v="urn:schemas-microsoft-com:vml" xmlns:pvml="urn:schemas-microsoft-com:office:powerpoint" xmlns:com="http://schemas.openxmlformats.org/drawingml/2006/compatibility" xmlns:p14="http://schemas.microsoft.com/office/powerpoint/2010/main" xmlns:p15="http://schemas.microsoft.com/office/powerpoint/2012/main" xmlns:ahyp="http://schemas.microsoft.com/office/drawing/2018/hyperlinkcolor" val="tx"/>
                       </a:ext>
                     </a:extLst>
                   </a:hlinkClick>
@@ -19704,7 +20750,7 @@
                   <a:hlinkClick r:id="rId3">
                     <a:extLst>
                       <a:ext uri="{A12FA001-AC4F-418D-AE19-62706E023703}">
-                        <ahyp:hlinkClr xmlns:ahyp="http://schemas.microsoft.com/office/drawing/2018/hyperlinkcolor" xmlns:p15="http://schemas.microsoft.com/office/powerpoint/2012/main" xmlns:p14="http://schemas.microsoft.com/office/powerpoint/2010/main" xmlns:com="http://schemas.openxmlformats.org/drawingml/2006/compatibility" xmlns:pvml="urn:schemas-microsoft-com:office:powerpoint" xmlns:v="urn:schemas-microsoft-com:vml" xmlns:o="urn:schemas-microsoft-com:office:office" xmlns:dgm="http://schemas.openxmlformats.org/drawingml/2006/diagram" xmlns:c="http://schemas.openxmlformats.org/drawingml/2006/chart" xmlns:mv="urn:schemas-microsoft-com:mac:vml" xmlns:mc="http://schemas.openxmlformats.org/markup-compatibility/2006" xmlns="" val="tx"/>
+                        <ahyp:hlinkClr xmlns="" xmlns:mc="http://schemas.openxmlformats.org/markup-compatibility/2006" xmlns:mv="urn:schemas-microsoft-com:mac:vml" xmlns:c="http://schemas.openxmlformats.org/drawingml/2006/chart" xmlns:dgm="http://schemas.openxmlformats.org/drawingml/2006/diagram" xmlns:o="urn:schemas-microsoft-com:office:office" xmlns:v="urn:schemas-microsoft-com:vml" xmlns:pvml="urn:schemas-microsoft-com:office:powerpoint" xmlns:com="http://schemas.openxmlformats.org/drawingml/2006/compatibility" xmlns:p14="http://schemas.microsoft.com/office/powerpoint/2010/main" xmlns:p15="http://schemas.microsoft.com/office/powerpoint/2012/main" xmlns:ahyp="http://schemas.microsoft.com/office/drawing/2018/hyperlinkcolor" val="tx"/>
                       </a:ext>
                     </a:extLst>
                   </a:hlinkClick>
@@ -19735,7 +20781,7 @@
                   <a:hlinkClick r:id="rId3">
                     <a:extLst>
                       <a:ext uri="{A12FA001-AC4F-418D-AE19-62706E023703}">
-                        <ahyp:hlinkClr xmlns:ahyp="http://schemas.microsoft.com/office/drawing/2018/hyperlinkcolor" xmlns:p15="http://schemas.microsoft.com/office/powerpoint/2012/main" xmlns:p14="http://schemas.microsoft.com/office/powerpoint/2010/main" xmlns:com="http://schemas.openxmlformats.org/drawingml/2006/compatibility" xmlns:pvml="urn:schemas-microsoft-com:office:powerpoint" xmlns:v="urn:schemas-microsoft-com:vml" xmlns:o="urn:schemas-microsoft-com:office:office" xmlns:dgm="http://schemas.openxmlformats.org/drawingml/2006/diagram" xmlns:c="http://schemas.openxmlformats.org/drawingml/2006/chart" xmlns:mv="urn:schemas-microsoft-com:mac:vml" xmlns:mc="http://schemas.openxmlformats.org/markup-compatibility/2006" xmlns="" val="tx"/>
+                        <ahyp:hlinkClr xmlns="" xmlns:mc="http://schemas.openxmlformats.org/markup-compatibility/2006" xmlns:mv="urn:schemas-microsoft-com:mac:vml" xmlns:c="http://schemas.openxmlformats.org/drawingml/2006/chart" xmlns:dgm="http://schemas.openxmlformats.org/drawingml/2006/diagram" xmlns:o="urn:schemas-microsoft-com:office:office" xmlns:v="urn:schemas-microsoft-com:vml" xmlns:pvml="urn:schemas-microsoft-com:office:powerpoint" xmlns:com="http://schemas.openxmlformats.org/drawingml/2006/compatibility" xmlns:p14="http://schemas.microsoft.com/office/powerpoint/2010/main" xmlns:p15="http://schemas.microsoft.com/office/powerpoint/2012/main" xmlns:ahyp="http://schemas.microsoft.com/office/drawing/2018/hyperlinkcolor" val="tx"/>
                       </a:ext>
                     </a:extLst>
                   </a:hlinkClick>
@@ -20109,7 +21155,7 @@
 </p:sld>
 </file>
 
-<file path=ppt/slides/slide18.xml><?xml version="1.0" encoding="utf-8"?>
+<file path=ppt/slides/slide19.xml><?xml version="1.0" encoding="utf-8"?>
 <p:sld xmlns:a="http://schemas.openxmlformats.org/drawingml/2006/main" xmlns:r="http://schemas.openxmlformats.org/officeDocument/2006/relationships" xmlns:p="http://schemas.openxmlformats.org/presentationml/2006/main">
   <p:cSld>
     <p:spTree>
@@ -20329,7 +21375,545 @@
 </p:sld>
 </file>
 
-<file path=ppt/slides/slide19.xml><?xml version="1.0" encoding="utf-8"?>
+<file path=ppt/slides/slide2.xml><?xml version="1.0" encoding="utf-8"?>
+<p:sld xmlns:a="http://schemas.openxmlformats.org/drawingml/2006/main" xmlns:r="http://schemas.openxmlformats.org/officeDocument/2006/relationships" xmlns:p="http://schemas.openxmlformats.org/presentationml/2006/main">
+  <p:cSld>
+    <p:spTree>
+      <p:nvGrpSpPr>
+        <p:cNvPr id="1" name="Shape 61"/>
+        <p:cNvGrpSpPr/>
+        <p:nvPr/>
+      </p:nvGrpSpPr>
+      <p:grpSpPr>
+        <a:xfrm>
+          <a:off x="0" y="0"/>
+          <a:ext cx="0" cy="0"/>
+          <a:chOff x="0" y="0"/>
+          <a:chExt cx="0" cy="0"/>
+        </a:xfrm>
+      </p:grpSpPr>
+      <p:sp>
+        <p:nvSpPr>
+          <p:cNvPr id="62" name="Google Shape;62;p2"/>
+          <p:cNvSpPr txBox="1">
+            <a:spLocks noGrp="1"/>
+          </p:cNvSpPr>
+          <p:nvPr>
+            <p:ph type="title"/>
+          </p:nvPr>
+        </p:nvSpPr>
+        <p:spPr>
+          <a:xfrm>
+            <a:off x="4496700" y="-1"/>
+            <a:ext cx="7562700" cy="677700"/>
+          </a:xfrm>
+          <a:prstGeom prst="rect">
+            <a:avLst/>
+          </a:prstGeom>
+          <a:noFill/>
+          <a:ln>
+            <a:noFill/>
+          </a:ln>
+        </p:spPr>
+        <p:txBody>
+          <a:bodyPr spcFirstLastPara="1" wrap="square" lIns="91425" tIns="45700" rIns="91425" bIns="45700" anchor="ctr" anchorCtr="0">
+            <a:noAutofit/>
+          </a:bodyPr>
+          <a:lstStyle/>
+          <a:p>
+            <a:pPr marL="0" lvl="0" indent="0" algn="r" rtl="0">
+              <a:lnSpc>
+                <a:spcPct val="90000"/>
+              </a:lnSpc>
+              <a:spcBef>
+                <a:spcPts val="0"/>
+              </a:spcBef>
+              <a:spcAft>
+                <a:spcPts val="0"/>
+              </a:spcAft>
+              <a:buNone/>
+            </a:pPr>
+            <a:r>
+              <a:rPr lang="pt-BR" sz="2800">
+                <a:solidFill>
+                  <a:schemeClr val="lt1"/>
+                </a:solidFill>
+                <a:latin typeface="Comic Sans MS"/>
+                <a:ea typeface="Comic Sans MS"/>
+                <a:cs typeface="Comic Sans MS"/>
+                <a:sym typeface="Comic Sans MS"/>
+              </a:rPr>
+              <a:t>Objetivos</a:t>
+            </a:r>
+            <a:endParaRPr>
+              <a:solidFill>
+                <a:schemeClr val="lt1"/>
+              </a:solidFill>
+              <a:latin typeface="Comic Sans MS"/>
+              <a:ea typeface="Comic Sans MS"/>
+              <a:cs typeface="Comic Sans MS"/>
+              <a:sym typeface="Comic Sans MS"/>
+            </a:endParaRPr>
+          </a:p>
+        </p:txBody>
+      </p:sp>
+      <p:sp>
+        <p:nvSpPr>
+          <p:cNvPr id="63" name="Google Shape;63;p2"/>
+          <p:cNvSpPr txBox="1">
+            <a:spLocks noGrp="1"/>
+          </p:cNvSpPr>
+          <p:nvPr>
+            <p:ph type="body" idx="1"/>
+          </p:nvPr>
+        </p:nvSpPr>
+        <p:spPr>
+          <a:xfrm>
+            <a:off x="439475" y="1260125"/>
+            <a:ext cx="11079300" cy="1313400"/>
+          </a:xfrm>
+          <a:prstGeom prst="rect">
+            <a:avLst/>
+          </a:prstGeom>
+          <a:noFill/>
+          <a:ln>
+            <a:noFill/>
+          </a:ln>
+        </p:spPr>
+        <p:txBody>
+          <a:bodyPr spcFirstLastPara="1" wrap="square" lIns="91425" tIns="45700" rIns="91425" bIns="45700" anchor="t" anchorCtr="0">
+            <a:noAutofit/>
+          </a:bodyPr>
+          <a:lstStyle/>
+          <a:p>
+            <a:pPr marL="457200" lvl="0" indent="-381000" algn="l" rtl="0">
+              <a:lnSpc>
+                <a:spcPct val="150000"/>
+              </a:lnSpc>
+              <a:spcBef>
+                <a:spcPts val="0"/>
+              </a:spcBef>
+              <a:spcAft>
+                <a:spcPts val="0"/>
+              </a:spcAft>
+              <a:buClr>
+                <a:srgbClr val="172B4D"/>
+              </a:buClr>
+              <a:buSzPts val="2400"/>
+              <a:buChar char="➔"/>
+            </a:pPr>
+            <a:r>
+              <a:rPr lang="pt-BR" dirty="0">
+                <a:solidFill>
+                  <a:srgbClr val="172B4D"/>
+                </a:solidFill>
+              </a:rPr>
+              <a:t>Apresentar os conceitos e etapas do processo de abertura de dados públicos e</a:t>
+            </a:r>
+            <a:endParaRPr dirty="0">
+              <a:solidFill>
+                <a:srgbClr val="172B4D"/>
+              </a:solidFill>
+            </a:endParaRPr>
+          </a:p>
+          <a:p>
+            <a:pPr marL="457200" lvl="0" indent="-381000" algn="l" rtl="0">
+              <a:lnSpc>
+                <a:spcPct val="150000"/>
+              </a:lnSpc>
+              <a:spcBef>
+                <a:spcPts val="0"/>
+              </a:spcBef>
+              <a:spcAft>
+                <a:spcPts val="0"/>
+              </a:spcAft>
+              <a:buClr>
+                <a:srgbClr val="172B4D"/>
+              </a:buClr>
+              <a:buSzPts val="2400"/>
+              <a:buChar char="➔"/>
+            </a:pPr>
+            <a:r>
+              <a:rPr lang="pt-BR" dirty="0">
+                <a:solidFill>
+                  <a:srgbClr val="172B4D"/>
+                </a:solidFill>
+              </a:rPr>
+              <a:t>Apresentar o Portal de Dados Abertos de MG (</a:t>
+            </a:r>
+            <a:r>
+              <a:rPr lang="pt-BR" dirty="0" err="1">
+                <a:solidFill>
+                  <a:srgbClr val="172B4D"/>
+                </a:solidFill>
+              </a:rPr>
+              <a:t>PdA</a:t>
+            </a:r>
+            <a:r>
+              <a:rPr lang="pt-BR" dirty="0">
+                <a:solidFill>
+                  <a:srgbClr val="172B4D"/>
+                </a:solidFill>
+              </a:rPr>
+              <a:t>).</a:t>
+            </a:r>
+            <a:endParaRPr sz="2400" dirty="0">
+              <a:solidFill>
+                <a:srgbClr val="172B4D"/>
+              </a:solidFill>
+            </a:endParaRPr>
+          </a:p>
+        </p:txBody>
+      </p:sp>
+      <p:sp>
+        <p:nvSpPr>
+          <p:cNvPr id="64" name="Google Shape;64;p2"/>
+          <p:cNvSpPr/>
+          <p:nvPr/>
+        </p:nvSpPr>
+        <p:spPr>
+          <a:xfrm>
+            <a:off x="0" y="-268986"/>
+            <a:ext cx="35320" cy="537973"/>
+          </a:xfrm>
+          <a:prstGeom prst="rect">
+            <a:avLst/>
+          </a:prstGeom>
+          <a:solidFill>
+            <a:srgbClr val="F4F5F7"/>
+          </a:solidFill>
+          <a:ln>
+            <a:noFill/>
+          </a:ln>
+        </p:spPr>
+        <p:txBody>
+          <a:bodyPr spcFirstLastPara="1" wrap="square" lIns="17450" tIns="0" rIns="17450" bIns="0" anchor="ctr" anchorCtr="0">
+            <a:spAutoFit/>
+          </a:bodyPr>
+          <a:lstStyle/>
+          <a:p>
+            <a:pPr marL="0" marR="0" lvl="0" indent="0" algn="l" rtl="0">
+              <a:lnSpc>
+                <a:spcPct val="100000"/>
+              </a:lnSpc>
+              <a:spcBef>
+                <a:spcPts val="0"/>
+              </a:spcBef>
+              <a:spcAft>
+                <a:spcPts val="0"/>
+              </a:spcAft>
+              <a:buClr>
+                <a:schemeClr val="dk1"/>
+              </a:buClr>
+              <a:buSzPts val="1800"/>
+              <a:buFont typeface="Arial Narrow"/>
+              <a:buNone/>
+            </a:pPr>
+            <a:endParaRPr sz="1800" b="0" i="0" u="none" strike="noStrike" cap="none">
+              <a:solidFill>
+                <a:schemeClr val="dk1"/>
+              </a:solidFill>
+              <a:latin typeface="Arial"/>
+              <a:ea typeface="Arial"/>
+              <a:cs typeface="Arial"/>
+              <a:sym typeface="Arial"/>
+            </a:endParaRPr>
+          </a:p>
+          <a:p>
+            <a:pPr marL="0" marR="0" lvl="0" indent="0" algn="l" rtl="0">
+              <a:lnSpc>
+                <a:spcPct val="100000"/>
+              </a:lnSpc>
+              <a:spcBef>
+                <a:spcPts val="0"/>
+              </a:spcBef>
+              <a:spcAft>
+                <a:spcPts val="0"/>
+              </a:spcAft>
+              <a:buClr>
+                <a:schemeClr val="dk1"/>
+              </a:buClr>
+              <a:buSzPts val="1800"/>
+              <a:buFont typeface="Arial Narrow"/>
+              <a:buNone/>
+            </a:pPr>
+            <a:endParaRPr sz="1800" b="0" i="0" u="none" strike="noStrike" cap="none">
+              <a:solidFill>
+                <a:schemeClr val="dk1"/>
+              </a:solidFill>
+              <a:latin typeface="Arial"/>
+              <a:ea typeface="Arial"/>
+              <a:cs typeface="Arial"/>
+              <a:sym typeface="Arial"/>
+            </a:endParaRPr>
+          </a:p>
+        </p:txBody>
+      </p:sp>
+      <p:sp>
+        <p:nvSpPr>
+          <p:cNvPr id="65" name="Google Shape;65;p2"/>
+          <p:cNvSpPr txBox="1"/>
+          <p:nvPr/>
+        </p:nvSpPr>
+        <p:spPr>
+          <a:xfrm>
+            <a:off x="3975725" y="2783075"/>
+            <a:ext cx="7972800" cy="3063000"/>
+          </a:xfrm>
+          <a:prstGeom prst="rect">
+            <a:avLst/>
+          </a:prstGeom>
+          <a:noFill/>
+          <a:ln>
+            <a:noFill/>
+          </a:ln>
+        </p:spPr>
+        <p:txBody>
+          <a:bodyPr spcFirstLastPara="1" wrap="square" lIns="91425" tIns="91425" rIns="91425" bIns="91425" anchor="t" anchorCtr="0">
+            <a:spAutoFit/>
+          </a:bodyPr>
+          <a:lstStyle/>
+          <a:p>
+            <a:pPr marL="0" lvl="0" indent="0" algn="l" rtl="0">
+              <a:lnSpc>
+                <a:spcPct val="150000"/>
+              </a:lnSpc>
+              <a:spcBef>
+                <a:spcPts val="0"/>
+              </a:spcBef>
+              <a:spcAft>
+                <a:spcPts val="0"/>
+              </a:spcAft>
+              <a:buNone/>
+            </a:pPr>
+            <a:r>
+              <a:rPr lang="pt-BR" sz="2200" b="1">
+                <a:solidFill>
+                  <a:srgbClr val="172B4D"/>
+                </a:solidFill>
+                <a:latin typeface="Arial Narrow"/>
+                <a:ea typeface="Arial Narrow"/>
+                <a:cs typeface="Arial Narrow"/>
+                <a:sym typeface="Arial Narrow"/>
+              </a:rPr>
+              <a:t>TÓPICOS:</a:t>
+            </a:r>
+            <a:endParaRPr sz="2200" b="1">
+              <a:solidFill>
+                <a:srgbClr val="888888"/>
+              </a:solidFill>
+              <a:latin typeface="Arial Narrow"/>
+              <a:ea typeface="Arial Narrow"/>
+              <a:cs typeface="Arial Narrow"/>
+              <a:sym typeface="Arial Narrow"/>
+            </a:endParaRPr>
+          </a:p>
+          <a:p>
+            <a:pPr marL="360000" lvl="3" indent="-330200" algn="l" rtl="0">
+              <a:lnSpc>
+                <a:spcPct val="150000"/>
+              </a:lnSpc>
+              <a:spcBef>
+                <a:spcPts val="0"/>
+              </a:spcBef>
+              <a:spcAft>
+                <a:spcPts val="0"/>
+              </a:spcAft>
+              <a:buClr>
+                <a:srgbClr val="172B4D"/>
+              </a:buClr>
+              <a:buSzPts val="2200"/>
+              <a:buFont typeface="Arial Narrow"/>
+              <a:buChar char="-"/>
+            </a:pPr>
+            <a:r>
+              <a:rPr lang="pt-BR" sz="2200">
+                <a:solidFill>
+                  <a:srgbClr val="172B4D"/>
+                </a:solidFill>
+                <a:latin typeface="Arial Narrow"/>
+                <a:ea typeface="Arial Narrow"/>
+                <a:cs typeface="Arial Narrow"/>
+                <a:sym typeface="Arial Narrow"/>
+              </a:rPr>
+              <a:t>Contexto normativo: requisitos legais sobre dados abertos;</a:t>
+            </a:r>
+            <a:endParaRPr sz="2200">
+              <a:solidFill>
+                <a:srgbClr val="172B4D"/>
+              </a:solidFill>
+              <a:latin typeface="Arial Narrow"/>
+              <a:ea typeface="Arial Narrow"/>
+              <a:cs typeface="Arial Narrow"/>
+              <a:sym typeface="Arial Narrow"/>
+            </a:endParaRPr>
+          </a:p>
+          <a:p>
+            <a:pPr marL="360000" lvl="3" indent="-330200" algn="l" rtl="0">
+              <a:lnSpc>
+                <a:spcPct val="150000"/>
+              </a:lnSpc>
+              <a:spcBef>
+                <a:spcPts val="0"/>
+              </a:spcBef>
+              <a:spcAft>
+                <a:spcPts val="0"/>
+              </a:spcAft>
+              <a:buClr>
+                <a:srgbClr val="172B4D"/>
+              </a:buClr>
+              <a:buSzPts val="2200"/>
+              <a:buFont typeface="Arial Narrow"/>
+              <a:buChar char="-"/>
+            </a:pPr>
+            <a:r>
+              <a:rPr lang="pt-BR" sz="2200">
+                <a:solidFill>
+                  <a:srgbClr val="172B4D"/>
+                </a:solidFill>
+                <a:latin typeface="Arial Narrow"/>
+                <a:ea typeface="Arial Narrow"/>
+                <a:cs typeface="Arial Narrow"/>
+                <a:sym typeface="Arial Narrow"/>
+              </a:rPr>
+              <a:t>Princípios e diretrizes: necessidades de documentação; </a:t>
+            </a:r>
+            <a:endParaRPr sz="2200">
+              <a:solidFill>
+                <a:srgbClr val="172B4D"/>
+              </a:solidFill>
+              <a:latin typeface="Arial Narrow"/>
+              <a:ea typeface="Arial Narrow"/>
+              <a:cs typeface="Arial Narrow"/>
+              <a:sym typeface="Arial Narrow"/>
+            </a:endParaRPr>
+          </a:p>
+          <a:p>
+            <a:pPr marL="360000" lvl="3" indent="-330200" algn="l" rtl="0">
+              <a:lnSpc>
+                <a:spcPct val="150000"/>
+              </a:lnSpc>
+              <a:spcBef>
+                <a:spcPts val="0"/>
+              </a:spcBef>
+              <a:spcAft>
+                <a:spcPts val="0"/>
+              </a:spcAft>
+              <a:buClr>
+                <a:srgbClr val="172B4D"/>
+              </a:buClr>
+              <a:buSzPts val="2200"/>
+              <a:buFont typeface="Arial Narrow"/>
+              <a:buChar char="-"/>
+            </a:pPr>
+            <a:r>
+              <a:rPr lang="pt-BR" sz="2200">
+                <a:solidFill>
+                  <a:srgbClr val="172B4D"/>
+                </a:solidFill>
+                <a:latin typeface="Arial Narrow"/>
+                <a:ea typeface="Arial Narrow"/>
+                <a:cs typeface="Arial Narrow"/>
+                <a:sym typeface="Arial Narrow"/>
+              </a:rPr>
+              <a:t>Portal de Dados Abertos: importância, usos e apresentação; e</a:t>
+            </a:r>
+            <a:endParaRPr>
+              <a:solidFill>
+                <a:srgbClr val="888888"/>
+              </a:solidFill>
+              <a:latin typeface="Arial Narrow"/>
+              <a:ea typeface="Arial Narrow"/>
+              <a:cs typeface="Arial Narrow"/>
+              <a:sym typeface="Arial Narrow"/>
+            </a:endParaRPr>
+          </a:p>
+          <a:p>
+            <a:pPr marL="360000" lvl="3" indent="-330200" algn="l" rtl="0">
+              <a:lnSpc>
+                <a:spcPct val="150000"/>
+              </a:lnSpc>
+              <a:spcBef>
+                <a:spcPts val="0"/>
+              </a:spcBef>
+              <a:spcAft>
+                <a:spcPts val="0"/>
+              </a:spcAft>
+              <a:buClr>
+                <a:srgbClr val="172B4D"/>
+              </a:buClr>
+              <a:buSzPts val="2200"/>
+              <a:buFont typeface="Arial Narrow"/>
+              <a:buChar char="-"/>
+            </a:pPr>
+            <a:r>
+              <a:rPr lang="pt-BR" sz="2200">
+                <a:solidFill>
+                  <a:srgbClr val="172B4D"/>
+                </a:solidFill>
+                <a:latin typeface="Arial Narrow"/>
+                <a:ea typeface="Arial Narrow"/>
+                <a:cs typeface="Arial Narrow"/>
+                <a:sym typeface="Arial Narrow"/>
+              </a:rPr>
+              <a:t>Próximos passos: plano de ação para documentação e catalogação no PdA.</a:t>
+            </a:r>
+            <a:endParaRPr sz="2200">
+              <a:solidFill>
+                <a:srgbClr val="172B4D"/>
+              </a:solidFill>
+              <a:latin typeface="Arial Narrow"/>
+              <a:ea typeface="Arial Narrow"/>
+              <a:cs typeface="Arial Narrow"/>
+              <a:sym typeface="Arial Narrow"/>
+            </a:endParaRPr>
+          </a:p>
+        </p:txBody>
+      </p:sp>
+      <p:pic>
+        <p:nvPicPr>
+          <p:cNvPr id="66" name="Google Shape;66;p2"/>
+          <p:cNvPicPr preferRelativeResize="0"/>
+          <p:nvPr/>
+        </p:nvPicPr>
+        <p:blipFill>
+          <a:blip r:embed="rId3">
+            <a:alphaModFix/>
+          </a:blip>
+          <a:stretch>
+            <a:fillRect/>
+          </a:stretch>
+        </p:blipFill>
+        <p:spPr>
+          <a:xfrm>
+            <a:off x="439474" y="3095350"/>
+            <a:ext cx="3054099" cy="2285800"/>
+          </a:xfrm>
+          <a:prstGeom prst="rect">
+            <a:avLst/>
+          </a:prstGeom>
+          <a:noFill/>
+          <a:ln>
+            <a:noFill/>
+          </a:ln>
+        </p:spPr>
+      </p:pic>
+    </p:spTree>
+  </p:cSld>
+  <p:clrMapOvr>
+    <a:masterClrMapping/>
+  </p:clrMapOvr>
+  <p:timing>
+    <p:tnLst>
+      <p:par>
+        <p:cTn id="1" dur="indefinite" restart="never" nodeType="tmRoot"/>
+      </p:par>
+    </p:tnLst>
+  </p:timing>
+</p:sld>
+</file>
+
+<file path=ppt/slides/slide20.xml><?xml version="1.0" encoding="utf-8"?>
 <p:sld xmlns:a="http://schemas.openxmlformats.org/drawingml/2006/main" xmlns:r="http://schemas.openxmlformats.org/officeDocument/2006/relationships" xmlns:p="http://schemas.openxmlformats.org/presentationml/2006/main">
   <p:cSld>
     <p:spTree>
@@ -20793,545 +22377,7 @@
 </p:sld>
 </file>
 
-<file path=ppt/slides/slide2.xml><?xml version="1.0" encoding="utf-8"?>
-<p:sld xmlns:a="http://schemas.openxmlformats.org/drawingml/2006/main" xmlns:r="http://schemas.openxmlformats.org/officeDocument/2006/relationships" xmlns:p="http://schemas.openxmlformats.org/presentationml/2006/main">
-  <p:cSld>
-    <p:spTree>
-      <p:nvGrpSpPr>
-        <p:cNvPr id="1" name="Shape 61"/>
-        <p:cNvGrpSpPr/>
-        <p:nvPr/>
-      </p:nvGrpSpPr>
-      <p:grpSpPr>
-        <a:xfrm>
-          <a:off x="0" y="0"/>
-          <a:ext cx="0" cy="0"/>
-          <a:chOff x="0" y="0"/>
-          <a:chExt cx="0" cy="0"/>
-        </a:xfrm>
-      </p:grpSpPr>
-      <p:sp>
-        <p:nvSpPr>
-          <p:cNvPr id="62" name="Google Shape;62;p2"/>
-          <p:cNvSpPr txBox="1">
-            <a:spLocks noGrp="1"/>
-          </p:cNvSpPr>
-          <p:nvPr>
-            <p:ph type="title"/>
-          </p:nvPr>
-        </p:nvSpPr>
-        <p:spPr>
-          <a:xfrm>
-            <a:off x="4496700" y="-1"/>
-            <a:ext cx="7562700" cy="677700"/>
-          </a:xfrm>
-          <a:prstGeom prst="rect">
-            <a:avLst/>
-          </a:prstGeom>
-          <a:noFill/>
-          <a:ln>
-            <a:noFill/>
-          </a:ln>
-        </p:spPr>
-        <p:txBody>
-          <a:bodyPr spcFirstLastPara="1" wrap="square" lIns="91425" tIns="45700" rIns="91425" bIns="45700" anchor="ctr" anchorCtr="0">
-            <a:noAutofit/>
-          </a:bodyPr>
-          <a:lstStyle/>
-          <a:p>
-            <a:pPr marL="0" lvl="0" indent="0" algn="r" rtl="0">
-              <a:lnSpc>
-                <a:spcPct val="90000"/>
-              </a:lnSpc>
-              <a:spcBef>
-                <a:spcPts val="0"/>
-              </a:spcBef>
-              <a:spcAft>
-                <a:spcPts val="0"/>
-              </a:spcAft>
-              <a:buNone/>
-            </a:pPr>
-            <a:r>
-              <a:rPr lang="pt-BR" sz="2800">
-                <a:solidFill>
-                  <a:schemeClr val="lt1"/>
-                </a:solidFill>
-                <a:latin typeface="Comic Sans MS"/>
-                <a:ea typeface="Comic Sans MS"/>
-                <a:cs typeface="Comic Sans MS"/>
-                <a:sym typeface="Comic Sans MS"/>
-              </a:rPr>
-              <a:t>Objetivos</a:t>
-            </a:r>
-            <a:endParaRPr>
-              <a:solidFill>
-                <a:schemeClr val="lt1"/>
-              </a:solidFill>
-              <a:latin typeface="Comic Sans MS"/>
-              <a:ea typeface="Comic Sans MS"/>
-              <a:cs typeface="Comic Sans MS"/>
-              <a:sym typeface="Comic Sans MS"/>
-            </a:endParaRPr>
-          </a:p>
-        </p:txBody>
-      </p:sp>
-      <p:sp>
-        <p:nvSpPr>
-          <p:cNvPr id="63" name="Google Shape;63;p2"/>
-          <p:cNvSpPr txBox="1">
-            <a:spLocks noGrp="1"/>
-          </p:cNvSpPr>
-          <p:nvPr>
-            <p:ph type="body" idx="1"/>
-          </p:nvPr>
-        </p:nvSpPr>
-        <p:spPr>
-          <a:xfrm>
-            <a:off x="439475" y="1260125"/>
-            <a:ext cx="11079300" cy="1313400"/>
-          </a:xfrm>
-          <a:prstGeom prst="rect">
-            <a:avLst/>
-          </a:prstGeom>
-          <a:noFill/>
-          <a:ln>
-            <a:noFill/>
-          </a:ln>
-        </p:spPr>
-        <p:txBody>
-          <a:bodyPr spcFirstLastPara="1" wrap="square" lIns="91425" tIns="45700" rIns="91425" bIns="45700" anchor="t" anchorCtr="0">
-            <a:noAutofit/>
-          </a:bodyPr>
-          <a:lstStyle/>
-          <a:p>
-            <a:pPr marL="457200" lvl="0" indent="-381000" algn="l" rtl="0">
-              <a:lnSpc>
-                <a:spcPct val="150000"/>
-              </a:lnSpc>
-              <a:spcBef>
-                <a:spcPts val="0"/>
-              </a:spcBef>
-              <a:spcAft>
-                <a:spcPts val="0"/>
-              </a:spcAft>
-              <a:buClr>
-                <a:srgbClr val="172B4D"/>
-              </a:buClr>
-              <a:buSzPts val="2400"/>
-              <a:buChar char="➔"/>
-            </a:pPr>
-            <a:r>
-              <a:rPr lang="pt-BR" dirty="0">
-                <a:solidFill>
-                  <a:srgbClr val="172B4D"/>
-                </a:solidFill>
-              </a:rPr>
-              <a:t>Apresentar os conceitos e etapas do processo de abertura de dados públicos e</a:t>
-            </a:r>
-            <a:endParaRPr dirty="0">
-              <a:solidFill>
-                <a:srgbClr val="172B4D"/>
-              </a:solidFill>
-            </a:endParaRPr>
-          </a:p>
-          <a:p>
-            <a:pPr marL="457200" lvl="0" indent="-381000" algn="l" rtl="0">
-              <a:lnSpc>
-                <a:spcPct val="150000"/>
-              </a:lnSpc>
-              <a:spcBef>
-                <a:spcPts val="0"/>
-              </a:spcBef>
-              <a:spcAft>
-                <a:spcPts val="0"/>
-              </a:spcAft>
-              <a:buClr>
-                <a:srgbClr val="172B4D"/>
-              </a:buClr>
-              <a:buSzPts val="2400"/>
-              <a:buChar char="➔"/>
-            </a:pPr>
-            <a:r>
-              <a:rPr lang="pt-BR" dirty="0">
-                <a:solidFill>
-                  <a:srgbClr val="172B4D"/>
-                </a:solidFill>
-              </a:rPr>
-              <a:t>Apresentar o Portal de Dados Abertos de MG (</a:t>
-            </a:r>
-            <a:r>
-              <a:rPr lang="pt-BR" dirty="0" err="1">
-                <a:solidFill>
-                  <a:srgbClr val="172B4D"/>
-                </a:solidFill>
-              </a:rPr>
-              <a:t>PdA</a:t>
-            </a:r>
-            <a:r>
-              <a:rPr lang="pt-BR" dirty="0">
-                <a:solidFill>
-                  <a:srgbClr val="172B4D"/>
-                </a:solidFill>
-              </a:rPr>
-              <a:t>).</a:t>
-            </a:r>
-            <a:endParaRPr sz="2400" dirty="0">
-              <a:solidFill>
-                <a:srgbClr val="172B4D"/>
-              </a:solidFill>
-            </a:endParaRPr>
-          </a:p>
-        </p:txBody>
-      </p:sp>
-      <p:sp>
-        <p:nvSpPr>
-          <p:cNvPr id="64" name="Google Shape;64;p2"/>
-          <p:cNvSpPr/>
-          <p:nvPr/>
-        </p:nvSpPr>
-        <p:spPr>
-          <a:xfrm>
-            <a:off x="0" y="-268986"/>
-            <a:ext cx="35320" cy="537973"/>
-          </a:xfrm>
-          <a:prstGeom prst="rect">
-            <a:avLst/>
-          </a:prstGeom>
-          <a:solidFill>
-            <a:srgbClr val="F4F5F7"/>
-          </a:solidFill>
-          <a:ln>
-            <a:noFill/>
-          </a:ln>
-        </p:spPr>
-        <p:txBody>
-          <a:bodyPr spcFirstLastPara="1" wrap="square" lIns="17450" tIns="0" rIns="17450" bIns="0" anchor="ctr" anchorCtr="0">
-            <a:spAutoFit/>
-          </a:bodyPr>
-          <a:lstStyle/>
-          <a:p>
-            <a:pPr marL="0" marR="0" lvl="0" indent="0" algn="l" rtl="0">
-              <a:lnSpc>
-                <a:spcPct val="100000"/>
-              </a:lnSpc>
-              <a:spcBef>
-                <a:spcPts val="0"/>
-              </a:spcBef>
-              <a:spcAft>
-                <a:spcPts val="0"/>
-              </a:spcAft>
-              <a:buClr>
-                <a:schemeClr val="dk1"/>
-              </a:buClr>
-              <a:buSzPts val="1800"/>
-              <a:buFont typeface="Arial Narrow"/>
-              <a:buNone/>
-            </a:pPr>
-            <a:endParaRPr sz="1800" b="0" i="0" u="none" strike="noStrike" cap="none">
-              <a:solidFill>
-                <a:schemeClr val="dk1"/>
-              </a:solidFill>
-              <a:latin typeface="Arial"/>
-              <a:ea typeface="Arial"/>
-              <a:cs typeface="Arial"/>
-              <a:sym typeface="Arial"/>
-            </a:endParaRPr>
-          </a:p>
-          <a:p>
-            <a:pPr marL="0" marR="0" lvl="0" indent="0" algn="l" rtl="0">
-              <a:lnSpc>
-                <a:spcPct val="100000"/>
-              </a:lnSpc>
-              <a:spcBef>
-                <a:spcPts val="0"/>
-              </a:spcBef>
-              <a:spcAft>
-                <a:spcPts val="0"/>
-              </a:spcAft>
-              <a:buClr>
-                <a:schemeClr val="dk1"/>
-              </a:buClr>
-              <a:buSzPts val="1800"/>
-              <a:buFont typeface="Arial Narrow"/>
-              <a:buNone/>
-            </a:pPr>
-            <a:endParaRPr sz="1800" b="0" i="0" u="none" strike="noStrike" cap="none">
-              <a:solidFill>
-                <a:schemeClr val="dk1"/>
-              </a:solidFill>
-              <a:latin typeface="Arial"/>
-              <a:ea typeface="Arial"/>
-              <a:cs typeface="Arial"/>
-              <a:sym typeface="Arial"/>
-            </a:endParaRPr>
-          </a:p>
-        </p:txBody>
-      </p:sp>
-      <p:sp>
-        <p:nvSpPr>
-          <p:cNvPr id="65" name="Google Shape;65;p2"/>
-          <p:cNvSpPr txBox="1"/>
-          <p:nvPr/>
-        </p:nvSpPr>
-        <p:spPr>
-          <a:xfrm>
-            <a:off x="3975725" y="2783075"/>
-            <a:ext cx="7972800" cy="3063000"/>
-          </a:xfrm>
-          <a:prstGeom prst="rect">
-            <a:avLst/>
-          </a:prstGeom>
-          <a:noFill/>
-          <a:ln>
-            <a:noFill/>
-          </a:ln>
-        </p:spPr>
-        <p:txBody>
-          <a:bodyPr spcFirstLastPara="1" wrap="square" lIns="91425" tIns="91425" rIns="91425" bIns="91425" anchor="t" anchorCtr="0">
-            <a:spAutoFit/>
-          </a:bodyPr>
-          <a:lstStyle/>
-          <a:p>
-            <a:pPr marL="0" lvl="0" indent="0" algn="l" rtl="0">
-              <a:lnSpc>
-                <a:spcPct val="150000"/>
-              </a:lnSpc>
-              <a:spcBef>
-                <a:spcPts val="0"/>
-              </a:spcBef>
-              <a:spcAft>
-                <a:spcPts val="0"/>
-              </a:spcAft>
-              <a:buNone/>
-            </a:pPr>
-            <a:r>
-              <a:rPr lang="pt-BR" sz="2200" b="1">
-                <a:solidFill>
-                  <a:srgbClr val="172B4D"/>
-                </a:solidFill>
-                <a:latin typeface="Arial Narrow"/>
-                <a:ea typeface="Arial Narrow"/>
-                <a:cs typeface="Arial Narrow"/>
-                <a:sym typeface="Arial Narrow"/>
-              </a:rPr>
-              <a:t>TÓPICOS:</a:t>
-            </a:r>
-            <a:endParaRPr sz="2200" b="1">
-              <a:solidFill>
-                <a:srgbClr val="888888"/>
-              </a:solidFill>
-              <a:latin typeface="Arial Narrow"/>
-              <a:ea typeface="Arial Narrow"/>
-              <a:cs typeface="Arial Narrow"/>
-              <a:sym typeface="Arial Narrow"/>
-            </a:endParaRPr>
-          </a:p>
-          <a:p>
-            <a:pPr marL="360000" lvl="3" indent="-330200" algn="l" rtl="0">
-              <a:lnSpc>
-                <a:spcPct val="150000"/>
-              </a:lnSpc>
-              <a:spcBef>
-                <a:spcPts val="0"/>
-              </a:spcBef>
-              <a:spcAft>
-                <a:spcPts val="0"/>
-              </a:spcAft>
-              <a:buClr>
-                <a:srgbClr val="172B4D"/>
-              </a:buClr>
-              <a:buSzPts val="2200"/>
-              <a:buFont typeface="Arial Narrow"/>
-              <a:buChar char="-"/>
-            </a:pPr>
-            <a:r>
-              <a:rPr lang="pt-BR" sz="2200">
-                <a:solidFill>
-                  <a:srgbClr val="172B4D"/>
-                </a:solidFill>
-                <a:latin typeface="Arial Narrow"/>
-                <a:ea typeface="Arial Narrow"/>
-                <a:cs typeface="Arial Narrow"/>
-                <a:sym typeface="Arial Narrow"/>
-              </a:rPr>
-              <a:t>Contexto normativo: requisitos legais sobre dados abertos;</a:t>
-            </a:r>
-            <a:endParaRPr sz="2200">
-              <a:solidFill>
-                <a:srgbClr val="172B4D"/>
-              </a:solidFill>
-              <a:latin typeface="Arial Narrow"/>
-              <a:ea typeface="Arial Narrow"/>
-              <a:cs typeface="Arial Narrow"/>
-              <a:sym typeface="Arial Narrow"/>
-            </a:endParaRPr>
-          </a:p>
-          <a:p>
-            <a:pPr marL="360000" lvl="3" indent="-330200" algn="l" rtl="0">
-              <a:lnSpc>
-                <a:spcPct val="150000"/>
-              </a:lnSpc>
-              <a:spcBef>
-                <a:spcPts val="0"/>
-              </a:spcBef>
-              <a:spcAft>
-                <a:spcPts val="0"/>
-              </a:spcAft>
-              <a:buClr>
-                <a:srgbClr val="172B4D"/>
-              </a:buClr>
-              <a:buSzPts val="2200"/>
-              <a:buFont typeface="Arial Narrow"/>
-              <a:buChar char="-"/>
-            </a:pPr>
-            <a:r>
-              <a:rPr lang="pt-BR" sz="2200">
-                <a:solidFill>
-                  <a:srgbClr val="172B4D"/>
-                </a:solidFill>
-                <a:latin typeface="Arial Narrow"/>
-                <a:ea typeface="Arial Narrow"/>
-                <a:cs typeface="Arial Narrow"/>
-                <a:sym typeface="Arial Narrow"/>
-              </a:rPr>
-              <a:t>Princípios e diretrizes: necessidades de documentação; </a:t>
-            </a:r>
-            <a:endParaRPr sz="2200">
-              <a:solidFill>
-                <a:srgbClr val="172B4D"/>
-              </a:solidFill>
-              <a:latin typeface="Arial Narrow"/>
-              <a:ea typeface="Arial Narrow"/>
-              <a:cs typeface="Arial Narrow"/>
-              <a:sym typeface="Arial Narrow"/>
-            </a:endParaRPr>
-          </a:p>
-          <a:p>
-            <a:pPr marL="360000" lvl="3" indent="-330200" algn="l" rtl="0">
-              <a:lnSpc>
-                <a:spcPct val="150000"/>
-              </a:lnSpc>
-              <a:spcBef>
-                <a:spcPts val="0"/>
-              </a:spcBef>
-              <a:spcAft>
-                <a:spcPts val="0"/>
-              </a:spcAft>
-              <a:buClr>
-                <a:srgbClr val="172B4D"/>
-              </a:buClr>
-              <a:buSzPts val="2200"/>
-              <a:buFont typeface="Arial Narrow"/>
-              <a:buChar char="-"/>
-            </a:pPr>
-            <a:r>
-              <a:rPr lang="pt-BR" sz="2200">
-                <a:solidFill>
-                  <a:srgbClr val="172B4D"/>
-                </a:solidFill>
-                <a:latin typeface="Arial Narrow"/>
-                <a:ea typeface="Arial Narrow"/>
-                <a:cs typeface="Arial Narrow"/>
-                <a:sym typeface="Arial Narrow"/>
-              </a:rPr>
-              <a:t>Portal de Dados Abertos: importância, usos e apresentação; e</a:t>
-            </a:r>
-            <a:endParaRPr>
-              <a:solidFill>
-                <a:srgbClr val="888888"/>
-              </a:solidFill>
-              <a:latin typeface="Arial Narrow"/>
-              <a:ea typeface="Arial Narrow"/>
-              <a:cs typeface="Arial Narrow"/>
-              <a:sym typeface="Arial Narrow"/>
-            </a:endParaRPr>
-          </a:p>
-          <a:p>
-            <a:pPr marL="360000" lvl="3" indent="-330200" algn="l" rtl="0">
-              <a:lnSpc>
-                <a:spcPct val="150000"/>
-              </a:lnSpc>
-              <a:spcBef>
-                <a:spcPts val="0"/>
-              </a:spcBef>
-              <a:spcAft>
-                <a:spcPts val="0"/>
-              </a:spcAft>
-              <a:buClr>
-                <a:srgbClr val="172B4D"/>
-              </a:buClr>
-              <a:buSzPts val="2200"/>
-              <a:buFont typeface="Arial Narrow"/>
-              <a:buChar char="-"/>
-            </a:pPr>
-            <a:r>
-              <a:rPr lang="pt-BR" sz="2200">
-                <a:solidFill>
-                  <a:srgbClr val="172B4D"/>
-                </a:solidFill>
-                <a:latin typeface="Arial Narrow"/>
-                <a:ea typeface="Arial Narrow"/>
-                <a:cs typeface="Arial Narrow"/>
-                <a:sym typeface="Arial Narrow"/>
-              </a:rPr>
-              <a:t>Próximos passos: plano de ação para documentação e catalogação no PdA.</a:t>
-            </a:r>
-            <a:endParaRPr sz="2200">
-              <a:solidFill>
-                <a:srgbClr val="172B4D"/>
-              </a:solidFill>
-              <a:latin typeface="Arial Narrow"/>
-              <a:ea typeface="Arial Narrow"/>
-              <a:cs typeface="Arial Narrow"/>
-              <a:sym typeface="Arial Narrow"/>
-            </a:endParaRPr>
-          </a:p>
-        </p:txBody>
-      </p:sp>
-      <p:pic>
-        <p:nvPicPr>
-          <p:cNvPr id="66" name="Google Shape;66;p2"/>
-          <p:cNvPicPr preferRelativeResize="0"/>
-          <p:nvPr/>
-        </p:nvPicPr>
-        <p:blipFill>
-          <a:blip r:embed="rId3">
-            <a:alphaModFix/>
-          </a:blip>
-          <a:stretch>
-            <a:fillRect/>
-          </a:stretch>
-        </p:blipFill>
-        <p:spPr>
-          <a:xfrm>
-            <a:off x="439474" y="3095350"/>
-            <a:ext cx="3054099" cy="2285800"/>
-          </a:xfrm>
-          <a:prstGeom prst="rect">
-            <a:avLst/>
-          </a:prstGeom>
-          <a:noFill/>
-          <a:ln>
-            <a:noFill/>
-          </a:ln>
-        </p:spPr>
-      </p:pic>
-    </p:spTree>
-  </p:cSld>
-  <p:clrMapOvr>
-    <a:masterClrMapping/>
-  </p:clrMapOvr>
-  <p:timing>
-    <p:tnLst>
-      <p:par>
-        <p:cTn id="1" dur="indefinite" restart="never" nodeType="tmRoot"/>
-      </p:par>
-    </p:tnLst>
-  </p:timing>
-</p:sld>
-</file>
-
-<file path=ppt/slides/slide20.xml><?xml version="1.0" encoding="utf-8"?>
+<file path=ppt/slides/slide21.xml><?xml version="1.0" encoding="utf-8"?>
 <p:sld xmlns:a="http://schemas.openxmlformats.org/drawingml/2006/main" xmlns:r="http://schemas.openxmlformats.org/officeDocument/2006/relationships" xmlns:p="http://schemas.openxmlformats.org/presentationml/2006/main">
   <p:cSld>
     <p:spTree>
@@ -21664,7 +22710,7 @@
 </p:sld>
 </file>
 
-<file path=ppt/slides/slide21.xml><?xml version="1.0" encoding="utf-8"?>
+<file path=ppt/slides/slide22.xml><?xml version="1.0" encoding="utf-8"?>
 <p:sld xmlns:a="http://schemas.openxmlformats.org/drawingml/2006/main" xmlns:r="http://schemas.openxmlformats.org/officeDocument/2006/relationships" xmlns:p="http://schemas.openxmlformats.org/presentationml/2006/main" show="0">
   <p:cSld>
     <p:spTree>
@@ -22056,7 +23102,7 @@
                   <a:hlinkClick r:id="rId3">
                     <a:extLst>
                       <a:ext uri="{A12FA001-AC4F-418D-AE19-62706E023703}">
-                        <ahyp:hlinkClr xmlns:ahyp="http://schemas.microsoft.com/office/drawing/2018/hyperlinkcolor" xmlns:p15="http://schemas.microsoft.com/office/powerpoint/2012/main" xmlns:p14="http://schemas.microsoft.com/office/powerpoint/2010/main" xmlns:com="http://schemas.openxmlformats.org/drawingml/2006/compatibility" xmlns:pvml="urn:schemas-microsoft-com:office:powerpoint" xmlns:v="urn:schemas-microsoft-com:vml" xmlns:o="urn:schemas-microsoft-com:office:office" xmlns:dgm="http://schemas.openxmlformats.org/drawingml/2006/diagram" xmlns:c="http://schemas.openxmlformats.org/drawingml/2006/chart" xmlns:mv="urn:schemas-microsoft-com:mac:vml" xmlns:mc="http://schemas.openxmlformats.org/markup-compatibility/2006" xmlns="" val="tx"/>
+                        <ahyp:hlinkClr xmlns="" xmlns:mc="http://schemas.openxmlformats.org/markup-compatibility/2006" xmlns:mv="urn:schemas-microsoft-com:mac:vml" xmlns:c="http://schemas.openxmlformats.org/drawingml/2006/chart" xmlns:dgm="http://schemas.openxmlformats.org/drawingml/2006/diagram" xmlns:o="urn:schemas-microsoft-com:office:office" xmlns:v="urn:schemas-microsoft-com:vml" xmlns:pvml="urn:schemas-microsoft-com:office:powerpoint" xmlns:com="http://schemas.openxmlformats.org/drawingml/2006/compatibility" xmlns:p14="http://schemas.microsoft.com/office/powerpoint/2010/main" xmlns:p15="http://schemas.microsoft.com/office/powerpoint/2012/main" xmlns:ahyp="http://schemas.microsoft.com/office/drawing/2018/hyperlinkcolor" val="tx"/>
                       </a:ext>
                     </a:extLst>
                   </a:hlinkClick>
@@ -22144,7 +23190,7 @@
                 <a:buNone/>
               </a:pPr>
               <a:r>
-                <a:rPr lang="pt-BR" sz="2200" b="1">
+                <a:rPr lang="pt-BR" sz="2200" b="1" dirty="0">
                   <a:solidFill>
                     <a:schemeClr val="dk1"/>
                   </a:solidFill>
@@ -22155,7 +23201,7 @@
                 </a:rPr>
                 <a:t>Validação dos dados</a:t>
               </a:r>
-              <a:endParaRPr sz="2200" b="1">
+              <a:endParaRPr sz="2200" b="1" dirty="0">
                 <a:solidFill>
                   <a:schemeClr val="dk1"/>
                 </a:solidFill>
@@ -22604,7 +23650,7 @@
 </p:sld>
 </file>
 
-<file path=ppt/slides/slide22.xml><?xml version="1.0" encoding="utf-8"?>
+<file path=ppt/slides/slide23.xml><?xml version="1.0" encoding="utf-8"?>
 <p:sld xmlns:a="http://schemas.openxmlformats.org/drawingml/2006/main" xmlns:r="http://schemas.openxmlformats.org/officeDocument/2006/relationships" xmlns:p="http://schemas.openxmlformats.org/presentationml/2006/main">
   <p:cSld>
     <p:spTree>
@@ -23019,7 +24065,7 @@
 </p:sld>
 </file>
 
-<file path=ppt/slides/slide23.xml><?xml version="1.0" encoding="utf-8"?>
+<file path=ppt/slides/slide24.xml><?xml version="1.0" encoding="utf-8"?>
 <p:sld xmlns:a="http://schemas.openxmlformats.org/drawingml/2006/main" xmlns:r="http://schemas.openxmlformats.org/officeDocument/2006/relationships" xmlns:p="http://schemas.openxmlformats.org/presentationml/2006/main">
   <p:cSld>
     <p:spTree>
@@ -23541,7 +24587,7 @@
 </p:sld>
 </file>
 
-<file path=ppt/slides/slide24.xml><?xml version="1.0" encoding="utf-8"?>
+<file path=ppt/slides/slide25.xml><?xml version="1.0" encoding="utf-8"?>
 <p:sld xmlns:a="http://schemas.openxmlformats.org/drawingml/2006/main" xmlns:r="http://schemas.openxmlformats.org/officeDocument/2006/relationships" xmlns:p="http://schemas.openxmlformats.org/presentationml/2006/main" show="0">
   <p:cSld>
     <p:spTree>
@@ -24050,11 +25096,11 @@
   <p:clrMapOvr>
     <a:masterClrMapping/>
   </p:clrMapOvr>
-  <mc:AlternateContent xmlns:mc="http://schemas.openxmlformats.org/markup-compatibility/2006">
-    <mc:Choice xmlns:p14="http://schemas.microsoft.com/office/powerpoint/2010/main" Requires="p14">
+  <mc:AlternateContent xmlns:mc="http://schemas.openxmlformats.org/markup-compatibility/2006" xmlns:p14="http://schemas.microsoft.com/office/powerpoint/2010/main">
+    <mc:Choice Requires="p14">
       <p:transition spd="slow" p14:dur="2000"/>
     </mc:Choice>
-    <mc:Fallback>
+    <mc:Fallback xmlns="">
       <p:transition spd="slow"/>
     </mc:Fallback>
   </mc:AlternateContent>
@@ -24068,7 +25114,7 @@
 </p:sld>
 </file>
 
-<file path=ppt/slides/slide25.xml><?xml version="1.0" encoding="utf-8"?>
+<file path=ppt/slides/slide26.xml><?xml version="1.0" encoding="utf-8"?>
 <p:sld xmlns:a="http://schemas.openxmlformats.org/drawingml/2006/main" xmlns:r="http://schemas.openxmlformats.org/officeDocument/2006/relationships" xmlns:p="http://schemas.openxmlformats.org/presentationml/2006/main">
   <p:cSld>
     <p:spTree>
@@ -24592,7 +25638,7 @@
 </p:sld>
 </file>
 
-<file path=ppt/slides/slide26.xml><?xml version="1.0" encoding="utf-8"?>
+<file path=ppt/slides/slide27.xml><?xml version="1.0" encoding="utf-8"?>
 <p:sld xmlns:a="http://schemas.openxmlformats.org/drawingml/2006/main" xmlns:r="http://schemas.openxmlformats.org/officeDocument/2006/relationships" xmlns:p="http://schemas.openxmlformats.org/presentationml/2006/main" show="0">
   <p:cSld>
     <p:spTree>
@@ -24892,7 +25938,7 @@
 </p:sld>
 </file>
 
-<file path=ppt/slides/slide27.xml><?xml version="1.0" encoding="utf-8"?>
+<file path=ppt/slides/slide28.xml><?xml version="1.0" encoding="utf-8"?>
 <p:sld xmlns:a="http://schemas.openxmlformats.org/drawingml/2006/main" xmlns:r="http://schemas.openxmlformats.org/officeDocument/2006/relationships" xmlns:p="http://schemas.openxmlformats.org/presentationml/2006/main">
   <p:cSld>
     <p:spTree>
@@ -25909,7 +26955,7 @@
                 <a:hlinkClick r:id="rId3">
                   <a:extLst>
                     <a:ext uri="{A12FA001-AC4F-418D-AE19-62706E023703}">
-                      <ahyp:hlinkClr xmlns:ahyp="http://schemas.microsoft.com/office/drawing/2018/hyperlinkcolor" xmlns:p15="http://schemas.microsoft.com/office/powerpoint/2012/main" xmlns:p14="http://schemas.microsoft.com/office/powerpoint/2010/main" xmlns:com="http://schemas.openxmlformats.org/drawingml/2006/compatibility" xmlns:pvml="urn:schemas-microsoft-com:office:powerpoint" xmlns:v="urn:schemas-microsoft-com:vml" xmlns:o="urn:schemas-microsoft-com:office:office" xmlns:dgm="http://schemas.openxmlformats.org/drawingml/2006/diagram" xmlns:c="http://schemas.openxmlformats.org/drawingml/2006/chart" xmlns:mv="urn:schemas-microsoft-com:mac:vml" xmlns:mc="http://schemas.openxmlformats.org/markup-compatibility/2006" xmlns="" val="tx"/>
+                      <ahyp:hlinkClr xmlns="" xmlns:mc="http://schemas.openxmlformats.org/markup-compatibility/2006" xmlns:mv="urn:schemas-microsoft-com:mac:vml" xmlns:c="http://schemas.openxmlformats.org/drawingml/2006/chart" xmlns:dgm="http://schemas.openxmlformats.org/drawingml/2006/diagram" xmlns:o="urn:schemas-microsoft-com:office:office" xmlns:v="urn:schemas-microsoft-com:vml" xmlns:pvml="urn:schemas-microsoft-com:office:powerpoint" xmlns:com="http://schemas.openxmlformats.org/drawingml/2006/compatibility" xmlns:p14="http://schemas.microsoft.com/office/powerpoint/2010/main" xmlns:p15="http://schemas.microsoft.com/office/powerpoint/2012/main" xmlns:ahyp="http://schemas.microsoft.com/office/drawing/2018/hyperlinkcolor" val="tx"/>
                     </a:ext>
                   </a:extLst>
                 </a:hlinkClick>
@@ -25931,7 +26977,7 @@
                 <a:hlinkClick r:id="rId3">
                   <a:extLst>
                     <a:ext uri="{A12FA001-AC4F-418D-AE19-62706E023703}">
-                      <ahyp:hlinkClr xmlns:ahyp="http://schemas.microsoft.com/office/drawing/2018/hyperlinkcolor" xmlns:p15="http://schemas.microsoft.com/office/powerpoint/2012/main" xmlns:p14="http://schemas.microsoft.com/office/powerpoint/2010/main" xmlns:com="http://schemas.openxmlformats.org/drawingml/2006/compatibility" xmlns:pvml="urn:schemas-microsoft-com:office:powerpoint" xmlns:v="urn:schemas-microsoft-com:vml" xmlns:o="urn:schemas-microsoft-com:office:office" xmlns:dgm="http://schemas.openxmlformats.org/drawingml/2006/diagram" xmlns:c="http://schemas.openxmlformats.org/drawingml/2006/chart" xmlns:mv="urn:schemas-microsoft-com:mac:vml" xmlns:mc="http://schemas.openxmlformats.org/markup-compatibility/2006" xmlns="" val="tx"/>
+                      <ahyp:hlinkClr xmlns="" xmlns:mc="http://schemas.openxmlformats.org/markup-compatibility/2006" xmlns:mv="urn:schemas-microsoft-com:mac:vml" xmlns:c="http://schemas.openxmlformats.org/drawingml/2006/chart" xmlns:dgm="http://schemas.openxmlformats.org/drawingml/2006/diagram" xmlns:o="urn:schemas-microsoft-com:office:office" xmlns:v="urn:schemas-microsoft-com:vml" xmlns:pvml="urn:schemas-microsoft-com:office:powerpoint" xmlns:com="http://schemas.openxmlformats.org/drawingml/2006/compatibility" xmlns:p14="http://schemas.microsoft.com/office/powerpoint/2010/main" xmlns:p15="http://schemas.microsoft.com/office/powerpoint/2012/main" xmlns:ahyp="http://schemas.microsoft.com/office/drawing/2018/hyperlinkcolor" val="tx"/>
                     </a:ext>
                   </a:extLst>
                 </a:hlinkClick>
@@ -26064,7 +27110,7 @@
                 <a:hlinkClick r:id="rId3">
                   <a:extLst>
                     <a:ext uri="{A12FA001-AC4F-418D-AE19-62706E023703}">
-                      <ahyp:hlinkClr xmlns:ahyp="http://schemas.microsoft.com/office/drawing/2018/hyperlinkcolor" xmlns:p15="http://schemas.microsoft.com/office/powerpoint/2012/main" xmlns:p14="http://schemas.microsoft.com/office/powerpoint/2010/main" xmlns:com="http://schemas.openxmlformats.org/drawingml/2006/compatibility" xmlns:pvml="urn:schemas-microsoft-com:office:powerpoint" xmlns:v="urn:schemas-microsoft-com:vml" xmlns:o="urn:schemas-microsoft-com:office:office" xmlns:dgm="http://schemas.openxmlformats.org/drawingml/2006/diagram" xmlns:c="http://schemas.openxmlformats.org/drawingml/2006/chart" xmlns:mv="urn:schemas-microsoft-com:mac:vml" xmlns:mc="http://schemas.openxmlformats.org/markup-compatibility/2006" xmlns="" val="tx"/>
+                      <ahyp:hlinkClr xmlns="" xmlns:mc="http://schemas.openxmlformats.org/markup-compatibility/2006" xmlns:mv="urn:schemas-microsoft-com:mac:vml" xmlns:c="http://schemas.openxmlformats.org/drawingml/2006/chart" xmlns:dgm="http://schemas.openxmlformats.org/drawingml/2006/diagram" xmlns:o="urn:schemas-microsoft-com:office:office" xmlns:v="urn:schemas-microsoft-com:vml" xmlns:pvml="urn:schemas-microsoft-com:office:powerpoint" xmlns:com="http://schemas.openxmlformats.org/drawingml/2006/compatibility" xmlns:p14="http://schemas.microsoft.com/office/powerpoint/2010/main" xmlns:p15="http://schemas.microsoft.com/office/powerpoint/2012/main" xmlns:ahyp="http://schemas.microsoft.com/office/drawing/2018/hyperlinkcolor" val="tx"/>
                     </a:ext>
                   </a:extLst>
                 </a:hlinkClick>
@@ -26089,7 +27135,7 @@
                 <a:hlinkClick r:id="rId3">
                   <a:extLst>
                     <a:ext uri="{A12FA001-AC4F-418D-AE19-62706E023703}">
-                      <ahyp:hlinkClr xmlns:ahyp="http://schemas.microsoft.com/office/drawing/2018/hyperlinkcolor" xmlns:p15="http://schemas.microsoft.com/office/powerpoint/2012/main" xmlns:p14="http://schemas.microsoft.com/office/powerpoint/2010/main" xmlns:com="http://schemas.openxmlformats.org/drawingml/2006/compatibility" xmlns:pvml="urn:schemas-microsoft-com:office:powerpoint" xmlns:v="urn:schemas-microsoft-com:vml" xmlns:o="urn:schemas-microsoft-com:office:office" xmlns:dgm="http://schemas.openxmlformats.org/drawingml/2006/diagram" xmlns:c="http://schemas.openxmlformats.org/drawingml/2006/chart" xmlns:mv="urn:schemas-microsoft-com:mac:vml" xmlns:mc="http://schemas.openxmlformats.org/markup-compatibility/2006" xmlns="" val="tx"/>
+                      <ahyp:hlinkClr xmlns="" xmlns:mc="http://schemas.openxmlformats.org/markup-compatibility/2006" xmlns:mv="urn:schemas-microsoft-com:mac:vml" xmlns:c="http://schemas.openxmlformats.org/drawingml/2006/chart" xmlns:dgm="http://schemas.openxmlformats.org/drawingml/2006/diagram" xmlns:o="urn:schemas-microsoft-com:office:office" xmlns:v="urn:schemas-microsoft-com:vml" xmlns:pvml="urn:schemas-microsoft-com:office:powerpoint" xmlns:com="http://schemas.openxmlformats.org/drawingml/2006/compatibility" xmlns:p14="http://schemas.microsoft.com/office/powerpoint/2010/main" xmlns:p15="http://schemas.microsoft.com/office/powerpoint/2012/main" xmlns:ahyp="http://schemas.microsoft.com/office/drawing/2018/hyperlinkcolor" val="tx"/>
                     </a:ext>
                   </a:extLst>
                 </a:hlinkClick>
@@ -26114,7 +27160,7 @@
                 <a:hlinkClick r:id="rId3">
                   <a:extLst>
                     <a:ext uri="{A12FA001-AC4F-418D-AE19-62706E023703}">
-                      <ahyp:hlinkClr xmlns:ahyp="http://schemas.microsoft.com/office/drawing/2018/hyperlinkcolor" xmlns:p15="http://schemas.microsoft.com/office/powerpoint/2012/main" xmlns:p14="http://schemas.microsoft.com/office/powerpoint/2010/main" xmlns:com="http://schemas.openxmlformats.org/drawingml/2006/compatibility" xmlns:pvml="urn:schemas-microsoft-com:office:powerpoint" xmlns:v="urn:schemas-microsoft-com:vml" xmlns:o="urn:schemas-microsoft-com:office:office" xmlns:dgm="http://schemas.openxmlformats.org/drawingml/2006/diagram" xmlns:c="http://schemas.openxmlformats.org/drawingml/2006/chart" xmlns:mv="urn:schemas-microsoft-com:mac:vml" xmlns:mc="http://schemas.openxmlformats.org/markup-compatibility/2006" xmlns="" val="tx"/>
+                      <ahyp:hlinkClr xmlns="" xmlns:mc="http://schemas.openxmlformats.org/markup-compatibility/2006" xmlns:mv="urn:schemas-microsoft-com:mac:vml" xmlns:c="http://schemas.openxmlformats.org/drawingml/2006/chart" xmlns:dgm="http://schemas.openxmlformats.org/drawingml/2006/diagram" xmlns:o="urn:schemas-microsoft-com:office:office" xmlns:v="urn:schemas-microsoft-com:vml" xmlns:pvml="urn:schemas-microsoft-com:office:powerpoint" xmlns:com="http://schemas.openxmlformats.org/drawingml/2006/compatibility" xmlns:p14="http://schemas.microsoft.com/office/powerpoint/2010/main" xmlns:p15="http://schemas.microsoft.com/office/powerpoint/2012/main" xmlns:ahyp="http://schemas.microsoft.com/office/drawing/2018/hyperlinkcolor" val="tx"/>
                     </a:ext>
                   </a:extLst>
                 </a:hlinkClick>
@@ -26139,7 +27185,7 @@
                 <a:hlinkClick r:id="rId3">
                   <a:extLst>
                     <a:ext uri="{A12FA001-AC4F-418D-AE19-62706E023703}">
-                      <ahyp:hlinkClr xmlns:ahyp="http://schemas.microsoft.com/office/drawing/2018/hyperlinkcolor" xmlns:p15="http://schemas.microsoft.com/office/powerpoint/2012/main" xmlns:p14="http://schemas.microsoft.com/office/powerpoint/2010/main" xmlns:com="http://schemas.openxmlformats.org/drawingml/2006/compatibility" xmlns:pvml="urn:schemas-microsoft-com:office:powerpoint" xmlns:v="urn:schemas-microsoft-com:vml" xmlns:o="urn:schemas-microsoft-com:office:office" xmlns:dgm="http://schemas.openxmlformats.org/drawingml/2006/diagram" xmlns:c="http://schemas.openxmlformats.org/drawingml/2006/chart" xmlns:mv="urn:schemas-microsoft-com:mac:vml" xmlns:mc="http://schemas.openxmlformats.org/markup-compatibility/2006" xmlns="" val="tx"/>
+                      <ahyp:hlinkClr xmlns="" xmlns:mc="http://schemas.openxmlformats.org/markup-compatibility/2006" xmlns:mv="urn:schemas-microsoft-com:mac:vml" xmlns:c="http://schemas.openxmlformats.org/drawingml/2006/chart" xmlns:dgm="http://schemas.openxmlformats.org/drawingml/2006/diagram" xmlns:o="urn:schemas-microsoft-com:office:office" xmlns:v="urn:schemas-microsoft-com:vml" xmlns:pvml="urn:schemas-microsoft-com:office:powerpoint" xmlns:com="http://schemas.openxmlformats.org/drawingml/2006/compatibility" xmlns:p14="http://schemas.microsoft.com/office/powerpoint/2010/main" xmlns:p15="http://schemas.microsoft.com/office/powerpoint/2012/main" xmlns:ahyp="http://schemas.microsoft.com/office/drawing/2018/hyperlinkcolor" val="tx"/>
                     </a:ext>
                   </a:extLst>
                 </a:hlinkClick>
@@ -26164,7 +27210,7 @@
                 <a:hlinkClick r:id="rId3">
                   <a:extLst>
                     <a:ext uri="{A12FA001-AC4F-418D-AE19-62706E023703}">
-                      <ahyp:hlinkClr xmlns:ahyp="http://schemas.microsoft.com/office/drawing/2018/hyperlinkcolor" xmlns:p15="http://schemas.microsoft.com/office/powerpoint/2012/main" xmlns:p14="http://schemas.microsoft.com/office/powerpoint/2010/main" xmlns:com="http://schemas.openxmlformats.org/drawingml/2006/compatibility" xmlns:pvml="urn:schemas-microsoft-com:office:powerpoint" xmlns:v="urn:schemas-microsoft-com:vml" xmlns:o="urn:schemas-microsoft-com:office:office" xmlns:dgm="http://schemas.openxmlformats.org/drawingml/2006/diagram" xmlns:c="http://schemas.openxmlformats.org/drawingml/2006/chart" xmlns:mv="urn:schemas-microsoft-com:mac:vml" xmlns:mc="http://schemas.openxmlformats.org/markup-compatibility/2006" xmlns="" val="tx"/>
+                      <ahyp:hlinkClr xmlns="" xmlns:mc="http://schemas.openxmlformats.org/markup-compatibility/2006" xmlns:mv="urn:schemas-microsoft-com:mac:vml" xmlns:c="http://schemas.openxmlformats.org/drawingml/2006/chart" xmlns:dgm="http://schemas.openxmlformats.org/drawingml/2006/diagram" xmlns:o="urn:schemas-microsoft-com:office:office" xmlns:v="urn:schemas-microsoft-com:vml" xmlns:pvml="urn:schemas-microsoft-com:office:powerpoint" xmlns:com="http://schemas.openxmlformats.org/drawingml/2006/compatibility" xmlns:p14="http://schemas.microsoft.com/office/powerpoint/2010/main" xmlns:p15="http://schemas.microsoft.com/office/powerpoint/2012/main" xmlns:ahyp="http://schemas.microsoft.com/office/drawing/2018/hyperlinkcolor" val="tx"/>
                     </a:ext>
                   </a:extLst>
                 </a:hlinkClick>
@@ -26189,7 +27235,7 @@
                 <a:hlinkClick r:id="rId3">
                   <a:extLst>
                     <a:ext uri="{A12FA001-AC4F-418D-AE19-62706E023703}">
-                      <ahyp:hlinkClr xmlns:ahyp="http://schemas.microsoft.com/office/drawing/2018/hyperlinkcolor" xmlns:p15="http://schemas.microsoft.com/office/powerpoint/2012/main" xmlns:p14="http://schemas.microsoft.com/office/powerpoint/2010/main" xmlns:com="http://schemas.openxmlformats.org/drawingml/2006/compatibility" xmlns:pvml="urn:schemas-microsoft-com:office:powerpoint" xmlns:v="urn:schemas-microsoft-com:vml" xmlns:o="urn:schemas-microsoft-com:office:office" xmlns:dgm="http://schemas.openxmlformats.org/drawingml/2006/diagram" xmlns:c="http://schemas.openxmlformats.org/drawingml/2006/chart" xmlns:mv="urn:schemas-microsoft-com:mac:vml" xmlns:mc="http://schemas.openxmlformats.org/markup-compatibility/2006" xmlns="" val="tx"/>
+                      <ahyp:hlinkClr xmlns="" xmlns:mc="http://schemas.openxmlformats.org/markup-compatibility/2006" xmlns:mv="urn:schemas-microsoft-com:mac:vml" xmlns:c="http://schemas.openxmlformats.org/drawingml/2006/chart" xmlns:dgm="http://schemas.openxmlformats.org/drawingml/2006/diagram" xmlns:o="urn:schemas-microsoft-com:office:office" xmlns:v="urn:schemas-microsoft-com:vml" xmlns:pvml="urn:schemas-microsoft-com:office:powerpoint" xmlns:com="http://schemas.openxmlformats.org/drawingml/2006/compatibility" xmlns:p14="http://schemas.microsoft.com/office/powerpoint/2010/main" xmlns:p15="http://schemas.microsoft.com/office/powerpoint/2012/main" xmlns:ahyp="http://schemas.microsoft.com/office/drawing/2018/hyperlinkcolor" val="tx"/>
                     </a:ext>
                   </a:extLst>
                 </a:hlinkClick>
@@ -26214,7 +27260,7 @@
                 <a:hlinkClick r:id="rId3">
                   <a:extLst>
                     <a:ext uri="{A12FA001-AC4F-418D-AE19-62706E023703}">
-                      <ahyp:hlinkClr xmlns:ahyp="http://schemas.microsoft.com/office/drawing/2018/hyperlinkcolor" xmlns:p15="http://schemas.microsoft.com/office/powerpoint/2012/main" xmlns:p14="http://schemas.microsoft.com/office/powerpoint/2010/main" xmlns:com="http://schemas.openxmlformats.org/drawingml/2006/compatibility" xmlns:pvml="urn:schemas-microsoft-com:office:powerpoint" xmlns:v="urn:schemas-microsoft-com:vml" xmlns:o="urn:schemas-microsoft-com:office:office" xmlns:dgm="http://schemas.openxmlformats.org/drawingml/2006/diagram" xmlns:c="http://schemas.openxmlformats.org/drawingml/2006/chart" xmlns:mv="urn:schemas-microsoft-com:mac:vml" xmlns:mc="http://schemas.openxmlformats.org/markup-compatibility/2006" xmlns="" val="tx"/>
+                      <ahyp:hlinkClr xmlns="" xmlns:mc="http://schemas.openxmlformats.org/markup-compatibility/2006" xmlns:mv="urn:schemas-microsoft-com:mac:vml" xmlns:c="http://schemas.openxmlformats.org/drawingml/2006/chart" xmlns:dgm="http://schemas.openxmlformats.org/drawingml/2006/diagram" xmlns:o="urn:schemas-microsoft-com:office:office" xmlns:v="urn:schemas-microsoft-com:vml" xmlns:pvml="urn:schemas-microsoft-com:office:powerpoint" xmlns:com="http://schemas.openxmlformats.org/drawingml/2006/compatibility" xmlns:p14="http://schemas.microsoft.com/office/powerpoint/2010/main" xmlns:p15="http://schemas.microsoft.com/office/powerpoint/2012/main" xmlns:ahyp="http://schemas.microsoft.com/office/drawing/2018/hyperlinkcolor" val="tx"/>
                     </a:ext>
                   </a:extLst>
                 </a:hlinkClick>
@@ -26239,7 +27285,7 @@
                 <a:hlinkClick r:id="rId3">
                   <a:extLst>
                     <a:ext uri="{A12FA001-AC4F-418D-AE19-62706E023703}">
-                      <ahyp:hlinkClr xmlns:ahyp="http://schemas.microsoft.com/office/drawing/2018/hyperlinkcolor" xmlns:p15="http://schemas.microsoft.com/office/powerpoint/2012/main" xmlns:p14="http://schemas.microsoft.com/office/powerpoint/2010/main" xmlns:com="http://schemas.openxmlformats.org/drawingml/2006/compatibility" xmlns:pvml="urn:schemas-microsoft-com:office:powerpoint" xmlns:v="urn:schemas-microsoft-com:vml" xmlns:o="urn:schemas-microsoft-com:office:office" xmlns:dgm="http://schemas.openxmlformats.org/drawingml/2006/diagram" xmlns:c="http://schemas.openxmlformats.org/drawingml/2006/chart" xmlns:mv="urn:schemas-microsoft-com:mac:vml" xmlns:mc="http://schemas.openxmlformats.org/markup-compatibility/2006" xmlns="" val="tx"/>
+                      <ahyp:hlinkClr xmlns="" xmlns:mc="http://schemas.openxmlformats.org/markup-compatibility/2006" xmlns:mv="urn:schemas-microsoft-com:mac:vml" xmlns:c="http://schemas.openxmlformats.org/drawingml/2006/chart" xmlns:dgm="http://schemas.openxmlformats.org/drawingml/2006/diagram" xmlns:o="urn:schemas-microsoft-com:office:office" xmlns:v="urn:schemas-microsoft-com:vml" xmlns:pvml="urn:schemas-microsoft-com:office:powerpoint" xmlns:com="http://schemas.openxmlformats.org/drawingml/2006/compatibility" xmlns:p14="http://schemas.microsoft.com/office/powerpoint/2010/main" xmlns:p15="http://schemas.microsoft.com/office/powerpoint/2012/main" xmlns:ahyp="http://schemas.microsoft.com/office/drawing/2018/hyperlinkcolor" val="tx"/>
                     </a:ext>
                   </a:extLst>
                 </a:hlinkClick>
@@ -26264,7 +27310,7 @@
                 <a:hlinkClick r:id="rId3">
                   <a:extLst>
                     <a:ext uri="{A12FA001-AC4F-418D-AE19-62706E023703}">
-                      <ahyp:hlinkClr xmlns:ahyp="http://schemas.microsoft.com/office/drawing/2018/hyperlinkcolor" xmlns:p15="http://schemas.microsoft.com/office/powerpoint/2012/main" xmlns:p14="http://schemas.microsoft.com/office/powerpoint/2010/main" xmlns:com="http://schemas.openxmlformats.org/drawingml/2006/compatibility" xmlns:pvml="urn:schemas-microsoft-com:office:powerpoint" xmlns:v="urn:schemas-microsoft-com:vml" xmlns:o="urn:schemas-microsoft-com:office:office" xmlns:dgm="http://schemas.openxmlformats.org/drawingml/2006/diagram" xmlns:c="http://schemas.openxmlformats.org/drawingml/2006/chart" xmlns:mv="urn:schemas-microsoft-com:mac:vml" xmlns:mc="http://schemas.openxmlformats.org/markup-compatibility/2006" xmlns="" val="tx"/>
+                      <ahyp:hlinkClr xmlns="" xmlns:mc="http://schemas.openxmlformats.org/markup-compatibility/2006" xmlns:mv="urn:schemas-microsoft-com:mac:vml" xmlns:c="http://schemas.openxmlformats.org/drawingml/2006/chart" xmlns:dgm="http://schemas.openxmlformats.org/drawingml/2006/diagram" xmlns:o="urn:schemas-microsoft-com:office:office" xmlns:v="urn:schemas-microsoft-com:vml" xmlns:pvml="urn:schemas-microsoft-com:office:powerpoint" xmlns:com="http://schemas.openxmlformats.org/drawingml/2006/compatibility" xmlns:p14="http://schemas.microsoft.com/office/powerpoint/2010/main" xmlns:p15="http://schemas.microsoft.com/office/powerpoint/2012/main" xmlns:ahyp="http://schemas.microsoft.com/office/drawing/2018/hyperlinkcolor" val="tx"/>
                     </a:ext>
                   </a:extLst>
                 </a:hlinkClick>
@@ -26286,7 +27332,7 @@
                 <a:hlinkClick r:id="rId3">
                   <a:extLst>
                     <a:ext uri="{A12FA001-AC4F-418D-AE19-62706E023703}">
-                      <ahyp:hlinkClr xmlns:ahyp="http://schemas.microsoft.com/office/drawing/2018/hyperlinkcolor" xmlns:p15="http://schemas.microsoft.com/office/powerpoint/2012/main" xmlns:p14="http://schemas.microsoft.com/office/powerpoint/2010/main" xmlns:com="http://schemas.openxmlformats.org/drawingml/2006/compatibility" xmlns:pvml="urn:schemas-microsoft-com:office:powerpoint" xmlns:v="urn:schemas-microsoft-com:vml" xmlns:o="urn:schemas-microsoft-com:office:office" xmlns:dgm="http://schemas.openxmlformats.org/drawingml/2006/diagram" xmlns:c="http://schemas.openxmlformats.org/drawingml/2006/chart" xmlns:mv="urn:schemas-microsoft-com:mac:vml" xmlns:mc="http://schemas.openxmlformats.org/markup-compatibility/2006" xmlns="" val="tx"/>
+                      <ahyp:hlinkClr xmlns="" xmlns:mc="http://schemas.openxmlformats.org/markup-compatibility/2006" xmlns:mv="urn:schemas-microsoft-com:mac:vml" xmlns:c="http://schemas.openxmlformats.org/drawingml/2006/chart" xmlns:dgm="http://schemas.openxmlformats.org/drawingml/2006/diagram" xmlns:o="urn:schemas-microsoft-com:office:office" xmlns:v="urn:schemas-microsoft-com:vml" xmlns:pvml="urn:schemas-microsoft-com:office:powerpoint" xmlns:com="http://schemas.openxmlformats.org/drawingml/2006/compatibility" xmlns:p14="http://schemas.microsoft.com/office/powerpoint/2010/main" xmlns:p15="http://schemas.microsoft.com/office/powerpoint/2012/main" xmlns:ahyp="http://schemas.microsoft.com/office/drawing/2018/hyperlinkcolor" val="tx"/>
                     </a:ext>
                   </a:extLst>
                 </a:hlinkClick>
@@ -26617,7 +27663,7 @@
                 <a:hlinkClick r:id="rId3">
                   <a:extLst>
                     <a:ext uri="{A12FA001-AC4F-418D-AE19-62706E023703}">
-                      <ahyp:hlinkClr xmlns:ahyp="http://schemas.microsoft.com/office/drawing/2018/hyperlinkcolor" xmlns:p15="http://schemas.microsoft.com/office/powerpoint/2012/main" xmlns:p14="http://schemas.microsoft.com/office/powerpoint/2010/main" xmlns:com="http://schemas.openxmlformats.org/drawingml/2006/compatibility" xmlns:pvml="urn:schemas-microsoft-com:office:powerpoint" xmlns:v="urn:schemas-microsoft-com:vml" xmlns:o="urn:schemas-microsoft-com:office:office" xmlns:dgm="http://schemas.openxmlformats.org/drawingml/2006/diagram" xmlns:c="http://schemas.openxmlformats.org/drawingml/2006/chart" xmlns:mv="urn:schemas-microsoft-com:mac:vml" xmlns:mc="http://schemas.openxmlformats.org/markup-compatibility/2006" xmlns="" val="tx"/>
+                      <ahyp:hlinkClr xmlns="" xmlns:mc="http://schemas.openxmlformats.org/markup-compatibility/2006" xmlns:mv="urn:schemas-microsoft-com:mac:vml" xmlns:c="http://schemas.openxmlformats.org/drawingml/2006/chart" xmlns:dgm="http://schemas.openxmlformats.org/drawingml/2006/diagram" xmlns:o="urn:schemas-microsoft-com:office:office" xmlns:v="urn:schemas-microsoft-com:vml" xmlns:pvml="urn:schemas-microsoft-com:office:powerpoint" xmlns:com="http://schemas.openxmlformats.org/drawingml/2006/compatibility" xmlns:p14="http://schemas.microsoft.com/office/powerpoint/2010/main" xmlns:p15="http://schemas.microsoft.com/office/powerpoint/2012/main" xmlns:ahyp="http://schemas.microsoft.com/office/drawing/2018/hyperlinkcolor" val="tx"/>
                     </a:ext>
                   </a:extLst>
                 </a:hlinkClick>
@@ -27407,7 +28453,7 @@
                 <a:hlinkClick r:id="rId6">
                   <a:extLst>
                     <a:ext uri="{A12FA001-AC4F-418D-AE19-62706E023703}">
-                      <ahyp:hlinkClr xmlns:ahyp="http://schemas.microsoft.com/office/drawing/2018/hyperlinkcolor" xmlns:p15="http://schemas.microsoft.com/office/powerpoint/2012/main" xmlns:p14="http://schemas.microsoft.com/office/powerpoint/2010/main" xmlns:com="http://schemas.openxmlformats.org/drawingml/2006/compatibility" xmlns:pvml="urn:schemas-microsoft-com:office:powerpoint" xmlns:v="urn:schemas-microsoft-com:vml" xmlns:o="urn:schemas-microsoft-com:office:office" xmlns:dgm="http://schemas.openxmlformats.org/drawingml/2006/diagram" xmlns:c="http://schemas.openxmlformats.org/drawingml/2006/chart" xmlns:mv="urn:schemas-microsoft-com:mac:vml" xmlns:mc="http://schemas.openxmlformats.org/markup-compatibility/2006" xmlns="" val="tx"/>
+                      <ahyp:hlinkClr xmlns="" xmlns:mc="http://schemas.openxmlformats.org/markup-compatibility/2006" xmlns:mv="urn:schemas-microsoft-com:mac:vml" xmlns:c="http://schemas.openxmlformats.org/drawingml/2006/chart" xmlns:dgm="http://schemas.openxmlformats.org/drawingml/2006/diagram" xmlns:o="urn:schemas-microsoft-com:office:office" xmlns:v="urn:schemas-microsoft-com:vml" xmlns:pvml="urn:schemas-microsoft-com:office:powerpoint" xmlns:com="http://schemas.openxmlformats.org/drawingml/2006/compatibility" xmlns:p14="http://schemas.microsoft.com/office/powerpoint/2010/main" xmlns:p15="http://schemas.microsoft.com/office/powerpoint/2012/main" xmlns:ahyp="http://schemas.microsoft.com/office/drawing/2018/hyperlinkcolor" val="tx"/>
                     </a:ext>
                   </a:extLst>
                 </a:hlinkClick>
@@ -27426,7 +28472,7 @@
                 <a:hlinkClick r:id="rId6">
                   <a:extLst>
                     <a:ext uri="{A12FA001-AC4F-418D-AE19-62706E023703}">
-                      <ahyp:hlinkClr xmlns:ahyp="http://schemas.microsoft.com/office/drawing/2018/hyperlinkcolor" xmlns:p15="http://schemas.microsoft.com/office/powerpoint/2012/main" xmlns:p14="http://schemas.microsoft.com/office/powerpoint/2010/main" xmlns:com="http://schemas.openxmlformats.org/drawingml/2006/compatibility" xmlns:pvml="urn:schemas-microsoft-com:office:powerpoint" xmlns:v="urn:schemas-microsoft-com:vml" xmlns:o="urn:schemas-microsoft-com:office:office" xmlns:dgm="http://schemas.openxmlformats.org/drawingml/2006/diagram" xmlns:c="http://schemas.openxmlformats.org/drawingml/2006/chart" xmlns:mv="urn:schemas-microsoft-com:mac:vml" xmlns:mc="http://schemas.openxmlformats.org/markup-compatibility/2006" xmlns="" val="tx"/>
+                      <ahyp:hlinkClr xmlns="" xmlns:mc="http://schemas.openxmlformats.org/markup-compatibility/2006" xmlns:mv="urn:schemas-microsoft-com:mac:vml" xmlns:c="http://schemas.openxmlformats.org/drawingml/2006/chart" xmlns:dgm="http://schemas.openxmlformats.org/drawingml/2006/diagram" xmlns:o="urn:schemas-microsoft-com:office:office" xmlns:v="urn:schemas-microsoft-com:vml" xmlns:pvml="urn:schemas-microsoft-com:office:powerpoint" xmlns:com="http://schemas.openxmlformats.org/drawingml/2006/compatibility" xmlns:p14="http://schemas.microsoft.com/office/powerpoint/2010/main" xmlns:p15="http://schemas.microsoft.com/office/powerpoint/2012/main" xmlns:ahyp="http://schemas.microsoft.com/office/drawing/2018/hyperlinkcolor" val="tx"/>
                     </a:ext>
                   </a:extLst>
                 </a:hlinkClick>
@@ -28216,7 +29262,7 @@
                 <a:hlinkClick r:id="rId3">
                   <a:extLst>
                     <a:ext uri="{A12FA001-AC4F-418D-AE19-62706E023703}">
-                      <ahyp:hlinkClr xmlns:ahyp="http://schemas.microsoft.com/office/drawing/2018/hyperlinkcolor" xmlns:p15="http://schemas.microsoft.com/office/powerpoint/2012/main" xmlns:p14="http://schemas.microsoft.com/office/powerpoint/2010/main" xmlns:com="http://schemas.openxmlformats.org/drawingml/2006/compatibility" xmlns:pvml="urn:schemas-microsoft-com:office:powerpoint" xmlns:v="urn:schemas-microsoft-com:vml" xmlns:o="urn:schemas-microsoft-com:office:office" xmlns:dgm="http://schemas.openxmlformats.org/drawingml/2006/diagram" xmlns:c="http://schemas.openxmlformats.org/drawingml/2006/chart" xmlns:mv="urn:schemas-microsoft-com:mac:vml" xmlns:mc="http://schemas.openxmlformats.org/markup-compatibility/2006" xmlns="" val="tx"/>
+                      <ahyp:hlinkClr xmlns="" xmlns:mc="http://schemas.openxmlformats.org/markup-compatibility/2006" xmlns:mv="urn:schemas-microsoft-com:mac:vml" xmlns:c="http://schemas.openxmlformats.org/drawingml/2006/chart" xmlns:dgm="http://schemas.openxmlformats.org/drawingml/2006/diagram" xmlns:o="urn:schemas-microsoft-com:office:office" xmlns:v="urn:schemas-microsoft-com:vml" xmlns:pvml="urn:schemas-microsoft-com:office:powerpoint" xmlns:com="http://schemas.openxmlformats.org/drawingml/2006/compatibility" xmlns:p14="http://schemas.microsoft.com/office/powerpoint/2010/main" xmlns:p15="http://schemas.microsoft.com/office/powerpoint/2012/main" xmlns:ahyp="http://schemas.microsoft.com/office/drawing/2018/hyperlinkcolor" val="tx"/>
                     </a:ext>
                   </a:extLst>
                 </a:hlinkClick>
@@ -28841,7 +29887,7 @@
                 <a:hlinkClick r:id="rId8">
                   <a:extLst>
                     <a:ext uri="{A12FA001-AC4F-418D-AE19-62706E023703}">
-                      <ahyp:hlinkClr xmlns:ahyp="http://schemas.microsoft.com/office/drawing/2018/hyperlinkcolor" xmlns:p15="http://schemas.microsoft.com/office/powerpoint/2012/main" xmlns:p14="http://schemas.microsoft.com/office/powerpoint/2010/main" xmlns:com="http://schemas.openxmlformats.org/drawingml/2006/compatibility" xmlns:pvml="urn:schemas-microsoft-com:office:powerpoint" xmlns:v="urn:schemas-microsoft-com:vml" xmlns:o="urn:schemas-microsoft-com:office:office" xmlns:dgm="http://schemas.openxmlformats.org/drawingml/2006/diagram" xmlns:c="http://schemas.openxmlformats.org/drawingml/2006/chart" xmlns:mv="urn:schemas-microsoft-com:mac:vml" xmlns:mc="http://schemas.openxmlformats.org/markup-compatibility/2006" xmlns="" val="tx"/>
+                      <ahyp:hlinkClr xmlns="" xmlns:mc="http://schemas.openxmlformats.org/markup-compatibility/2006" xmlns:mv="urn:schemas-microsoft-com:mac:vml" xmlns:c="http://schemas.openxmlformats.org/drawingml/2006/chart" xmlns:dgm="http://schemas.openxmlformats.org/drawingml/2006/diagram" xmlns:o="urn:schemas-microsoft-com:office:office" xmlns:v="urn:schemas-microsoft-com:vml" xmlns:pvml="urn:schemas-microsoft-com:office:powerpoint" xmlns:com="http://schemas.openxmlformats.org/drawingml/2006/compatibility" xmlns:p14="http://schemas.microsoft.com/office/powerpoint/2010/main" xmlns:p15="http://schemas.microsoft.com/office/powerpoint/2012/main" xmlns:ahyp="http://schemas.microsoft.com/office/drawing/2018/hyperlinkcolor" val="tx"/>
                     </a:ext>
                   </a:extLst>
                 </a:hlinkClick>
@@ -29125,7 +30171,7 @@
                 <a:hlinkClick r:id="rId3">
                   <a:extLst>
                     <a:ext uri="{A12FA001-AC4F-418D-AE19-62706E023703}">
-                      <ahyp:hlinkClr xmlns:ahyp="http://schemas.microsoft.com/office/drawing/2018/hyperlinkcolor" xmlns:p15="http://schemas.microsoft.com/office/powerpoint/2012/main" xmlns:p14="http://schemas.microsoft.com/office/powerpoint/2010/main" xmlns:com="http://schemas.openxmlformats.org/drawingml/2006/compatibility" xmlns:pvml="urn:schemas-microsoft-com:office:powerpoint" xmlns:v="urn:schemas-microsoft-com:vml" xmlns:o="urn:schemas-microsoft-com:office:office" xmlns:dgm="http://schemas.openxmlformats.org/drawingml/2006/diagram" xmlns:c="http://schemas.openxmlformats.org/drawingml/2006/chart" xmlns:mv="urn:schemas-microsoft-com:mac:vml" xmlns:mc="http://schemas.openxmlformats.org/markup-compatibility/2006" xmlns="" val="tx"/>
+                      <ahyp:hlinkClr xmlns="" xmlns:mc="http://schemas.openxmlformats.org/markup-compatibility/2006" xmlns:mv="urn:schemas-microsoft-com:mac:vml" xmlns:c="http://schemas.openxmlformats.org/drawingml/2006/chart" xmlns:dgm="http://schemas.openxmlformats.org/drawingml/2006/diagram" xmlns:o="urn:schemas-microsoft-com:office:office" xmlns:v="urn:schemas-microsoft-com:vml" xmlns:pvml="urn:schemas-microsoft-com:office:powerpoint" xmlns:com="http://schemas.openxmlformats.org/drawingml/2006/compatibility" xmlns:p14="http://schemas.microsoft.com/office/powerpoint/2010/main" xmlns:p15="http://schemas.microsoft.com/office/powerpoint/2012/main" xmlns:ahyp="http://schemas.microsoft.com/office/drawing/2018/hyperlinkcolor" val="tx"/>
                     </a:ext>
                   </a:extLst>
                 </a:hlinkClick>
@@ -29164,7 +30210,7 @@
                 <a:hlinkClick r:id="rId4">
                   <a:extLst>
                     <a:ext uri="{A12FA001-AC4F-418D-AE19-62706E023703}">
-                      <ahyp:hlinkClr xmlns:ahyp="http://schemas.microsoft.com/office/drawing/2018/hyperlinkcolor" xmlns:p15="http://schemas.microsoft.com/office/powerpoint/2012/main" xmlns:p14="http://schemas.microsoft.com/office/powerpoint/2010/main" xmlns:com="http://schemas.openxmlformats.org/drawingml/2006/compatibility" xmlns:pvml="urn:schemas-microsoft-com:office:powerpoint" xmlns:v="urn:schemas-microsoft-com:vml" xmlns:o="urn:schemas-microsoft-com:office:office" xmlns:dgm="http://schemas.openxmlformats.org/drawingml/2006/diagram" xmlns:c="http://schemas.openxmlformats.org/drawingml/2006/chart" xmlns:mv="urn:schemas-microsoft-com:mac:vml" xmlns:mc="http://schemas.openxmlformats.org/markup-compatibility/2006" xmlns="" val="tx"/>
+                      <ahyp:hlinkClr xmlns="" xmlns:mc="http://schemas.openxmlformats.org/markup-compatibility/2006" xmlns:mv="urn:schemas-microsoft-com:mac:vml" xmlns:c="http://schemas.openxmlformats.org/drawingml/2006/chart" xmlns:dgm="http://schemas.openxmlformats.org/drawingml/2006/diagram" xmlns:o="urn:schemas-microsoft-com:office:office" xmlns:v="urn:schemas-microsoft-com:vml" xmlns:pvml="urn:schemas-microsoft-com:office:powerpoint" xmlns:com="http://schemas.openxmlformats.org/drawingml/2006/compatibility" xmlns:p14="http://schemas.microsoft.com/office/powerpoint/2010/main" xmlns:p15="http://schemas.microsoft.com/office/powerpoint/2012/main" xmlns:ahyp="http://schemas.microsoft.com/office/drawing/2018/hyperlinkcolor" val="tx"/>
                     </a:ext>
                   </a:extLst>
                 </a:hlinkClick>

</xml_diff>